<commit_message>
Updated Hacky Hour logo for Pasco
</commit_message>
<xml_diff>
--- a/material_design/ResBazAZ_advertising.pptx
+++ b/material_design/ResBazAZ_advertising.pptx
@@ -201,7 +201,7 @@
           <a:p>
             <a:fld id="{89557B8F-298D-0F41-8E5F-760EBE3A772C}" type="datetimeFigureOut">
               <a:rPr lang="en-US" smtClean="0"/>
-              <a:t>9/29/16</a:t>
+              <a:t>1/19/17</a:t>
             </a:fld>
             <a:endParaRPr lang="en-US"/>
           </a:p>
@@ -684,7 +684,7 @@
           <a:p>
             <a:fld id="{7CB893AC-A63D-E544-9034-F1928B542F5E}" type="datetimeFigureOut">
               <a:rPr lang="en-US" smtClean="0"/>
-              <a:t>9/29/16</a:t>
+              <a:t>1/19/17</a:t>
             </a:fld>
             <a:endParaRPr lang="en-US"/>
           </a:p>
@@ -854,7 +854,7 @@
           <a:p>
             <a:fld id="{7CB893AC-A63D-E544-9034-F1928B542F5E}" type="datetimeFigureOut">
               <a:rPr lang="en-US" smtClean="0"/>
-              <a:t>9/29/16</a:t>
+              <a:t>1/19/17</a:t>
             </a:fld>
             <a:endParaRPr lang="en-US"/>
           </a:p>
@@ -1034,7 +1034,7 @@
           <a:p>
             <a:fld id="{7CB893AC-A63D-E544-9034-F1928B542F5E}" type="datetimeFigureOut">
               <a:rPr lang="en-US" smtClean="0"/>
-              <a:t>9/29/16</a:t>
+              <a:t>1/19/17</a:t>
             </a:fld>
             <a:endParaRPr lang="en-US"/>
           </a:p>
@@ -1204,7 +1204,7 @@
           <a:p>
             <a:fld id="{7CB893AC-A63D-E544-9034-F1928B542F5E}" type="datetimeFigureOut">
               <a:rPr lang="en-US" smtClean="0"/>
-              <a:t>9/29/16</a:t>
+              <a:t>1/19/17</a:t>
             </a:fld>
             <a:endParaRPr lang="en-US"/>
           </a:p>
@@ -1450,7 +1450,7 @@
           <a:p>
             <a:fld id="{7CB893AC-A63D-E544-9034-F1928B542F5E}" type="datetimeFigureOut">
               <a:rPr lang="en-US" smtClean="0"/>
-              <a:t>9/29/16</a:t>
+              <a:t>1/19/17</a:t>
             </a:fld>
             <a:endParaRPr lang="en-US"/>
           </a:p>
@@ -1682,7 +1682,7 @@
           <a:p>
             <a:fld id="{7CB893AC-A63D-E544-9034-F1928B542F5E}" type="datetimeFigureOut">
               <a:rPr lang="en-US" smtClean="0"/>
-              <a:t>9/29/16</a:t>
+              <a:t>1/19/17</a:t>
             </a:fld>
             <a:endParaRPr lang="en-US"/>
           </a:p>
@@ -2049,7 +2049,7 @@
           <a:p>
             <a:fld id="{7CB893AC-A63D-E544-9034-F1928B542F5E}" type="datetimeFigureOut">
               <a:rPr lang="en-US" smtClean="0"/>
-              <a:t>9/29/16</a:t>
+              <a:t>1/19/17</a:t>
             </a:fld>
             <a:endParaRPr lang="en-US"/>
           </a:p>
@@ -2167,7 +2167,7 @@
           <a:p>
             <a:fld id="{7CB893AC-A63D-E544-9034-F1928B542F5E}" type="datetimeFigureOut">
               <a:rPr lang="en-US" smtClean="0"/>
-              <a:t>9/29/16</a:t>
+              <a:t>1/19/17</a:t>
             </a:fld>
             <a:endParaRPr lang="en-US"/>
           </a:p>
@@ -2262,7 +2262,7 @@
           <a:p>
             <a:fld id="{7CB893AC-A63D-E544-9034-F1928B542F5E}" type="datetimeFigureOut">
               <a:rPr lang="en-US" smtClean="0"/>
-              <a:t>9/29/16</a:t>
+              <a:t>1/19/17</a:t>
             </a:fld>
             <a:endParaRPr lang="en-US"/>
           </a:p>
@@ -2539,7 +2539,7 @@
           <a:p>
             <a:fld id="{7CB893AC-A63D-E544-9034-F1928B542F5E}" type="datetimeFigureOut">
               <a:rPr lang="en-US" smtClean="0"/>
-              <a:t>9/29/16</a:t>
+              <a:t>1/19/17</a:t>
             </a:fld>
             <a:endParaRPr lang="en-US"/>
           </a:p>
@@ -2792,7 +2792,7 @@
           <a:p>
             <a:fld id="{7CB893AC-A63D-E544-9034-F1928B542F5E}" type="datetimeFigureOut">
               <a:rPr lang="en-US" smtClean="0"/>
-              <a:t>9/29/16</a:t>
+              <a:t>1/19/17</a:t>
             </a:fld>
             <a:endParaRPr lang="en-US"/>
           </a:p>
@@ -3005,7 +3005,7 @@
           <a:p>
             <a:fld id="{7CB893AC-A63D-E544-9034-F1928B542F5E}" type="datetimeFigureOut">
               <a:rPr lang="en-US" smtClean="0"/>
-              <a:t>9/29/16</a:t>
+              <a:t>1/19/17</a:t>
             </a:fld>
             <a:endParaRPr lang="en-US"/>
           </a:p>
@@ -3419,9 +3419,9 @@
         <p:grpSpPr>
           <a:xfrm>
             <a:off x="2819819" y="599686"/>
-            <a:ext cx="5631193" cy="5706657"/>
+            <a:ext cx="5631193" cy="5891323"/>
             <a:chOff x="2792387" y="270502"/>
-            <a:chExt cx="5631193" cy="5706657"/>
+            <a:chExt cx="5631193" cy="5891323"/>
           </a:xfrm>
           <a:solidFill>
             <a:schemeClr val="bg1"/>
@@ -3545,7 +3545,7 @@
           <p:spPr>
             <a:xfrm>
               <a:off x="2792387" y="5515494"/>
-              <a:ext cx="2587610" cy="461665"/>
+              <a:ext cx="2587610" cy="646331"/>
             </a:xfrm>
             <a:prstGeom prst="rect">
               <a:avLst/>
@@ -3576,13 +3576,27 @@
                   <a:ea typeface="Arial" charset="0"/>
                   <a:cs typeface="Arial" charset="0"/>
                 </a:rPr>
-                <a:t>Nucleus Café, Keating Building</a:t>
+                <a:t>Nucleus Café, </a:t>
               </a:r>
-              <a:endParaRPr lang="en-US" sz="1200" dirty="0">
-                <a:latin typeface="Arial" charset="0"/>
-                <a:ea typeface="Arial" charset="0"/>
-                <a:cs typeface="Arial" charset="0"/>
-              </a:endParaRPr>
+              <a:r>
+                <a:rPr lang="en-US" sz="1200" dirty="0">
+                  <a:latin typeface="Arial" charset="0"/>
+                  <a:ea typeface="Arial" charset="0"/>
+                  <a:cs typeface="Arial" charset="0"/>
+                </a:rPr>
+                <a:t>(Keating Building)</a:t>
+              </a:r>
+            </a:p>
+            <a:p>
+              <a:pPr algn="ctr"/>
+              <a:r>
+                <a:rPr lang="en-US" sz="1200" dirty="0">
+                  <a:latin typeface="Arial" charset="0"/>
+                  <a:ea typeface="Arial" charset="0"/>
+                  <a:cs typeface="Arial" charset="0"/>
+                </a:rPr>
+                <a:t>1657 E Helen St</a:t>
+              </a:r>
             </a:p>
           </p:txBody>
         </p:sp>
@@ -3595,7 +3609,7 @@
           <p:spPr>
             <a:xfrm>
               <a:off x="5960627" y="5515494"/>
-              <a:ext cx="2462953" cy="461665"/>
+              <a:ext cx="2462953" cy="646331"/>
             </a:xfrm>
             <a:prstGeom prst="rect">
               <a:avLst/>
@@ -3621,18 +3635,24 @@
             <a:p>
               <a:pPr algn="ctr"/>
               <a:r>
-                <a:rPr lang="en-US" sz="1200" dirty="0" smtClean="0">
+                <a:rPr lang="en-US" sz="1200" dirty="0">
                   <a:latin typeface="Arial" charset="0"/>
                   <a:ea typeface="Arial" charset="0"/>
                   <a:cs typeface="Arial" charset="0"/>
                 </a:rPr>
-                <a:t>Gentle Ben’s Brewing Upstairs</a:t>
+                <a:t>Pasco (Main Gate Square) </a:t>
               </a:r>
-              <a:endParaRPr lang="en-US" sz="1200" dirty="0">
-                <a:latin typeface="Arial" charset="0"/>
-                <a:ea typeface="Arial" charset="0"/>
-                <a:cs typeface="Arial" charset="0"/>
-              </a:endParaRPr>
+            </a:p>
+            <a:p>
+              <a:pPr algn="ctr"/>
+              <a:r>
+                <a:rPr lang="en-US" sz="1200" dirty="0">
+                  <a:latin typeface="Arial" charset="0"/>
+                  <a:ea typeface="Arial" charset="0"/>
+                  <a:cs typeface="Arial" charset="0"/>
+                </a:rPr>
+                <a:t>820 E University Blvd</a:t>
+              </a:r>
             </a:p>
           </p:txBody>
         </p:sp>
@@ -3792,605 +3812,681 @@
       </p:grpSpPr>
       <p:grpSp>
         <p:nvGrpSpPr>
-          <p:cNvPr id="6" name="Group 5"/>
+          <p:cNvPr id="2" name="Group 1"/>
           <p:cNvGrpSpPr/>
           <p:nvPr/>
         </p:nvGrpSpPr>
         <p:grpSpPr>
           <a:xfrm>
             <a:off x="1640717" y="-1234136"/>
-            <a:ext cx="9043416" cy="9681359"/>
+            <a:ext cx="9043416" cy="9909956"/>
             <a:chOff x="1640717" y="-1234136"/>
-            <a:chExt cx="9043416" cy="9681359"/>
+            <a:chExt cx="9043416" cy="9909956"/>
           </a:xfrm>
         </p:grpSpPr>
-        <p:sp>
-          <p:nvSpPr>
-            <p:cNvPr id="51" name="Rectangle 50"/>
-            <p:cNvSpPr/>
+        <p:grpSp>
+          <p:nvGrpSpPr>
+            <p:cNvPr id="6" name="Group 5"/>
+            <p:cNvGrpSpPr/>
             <p:nvPr/>
-          </p:nvSpPr>
-          <p:spPr>
+          </p:nvGrpSpPr>
+          <p:grpSpPr>
             <a:xfrm>
-              <a:off x="1640717" y="-1214162"/>
-              <a:ext cx="9043416" cy="9661385"/>
+              <a:off x="1640717" y="-1234136"/>
+              <a:ext cx="9043416" cy="9909956"/>
+              <a:chOff x="1640717" y="-1234136"/>
+              <a:chExt cx="9043416" cy="9909956"/>
             </a:xfrm>
-            <a:prstGeom prst="rect">
-              <a:avLst/>
-            </a:prstGeom>
-            <a:solidFill>
-              <a:schemeClr val="bg1"/>
-            </a:solidFill>
-            <a:ln>
-              <a:noFill/>
-            </a:ln>
-          </p:spPr>
-          <p:style>
-            <a:lnRef idx="2">
-              <a:schemeClr val="accent1">
-                <a:shade val="50000"/>
-              </a:schemeClr>
-            </a:lnRef>
-            <a:fillRef idx="1">
-              <a:schemeClr val="accent1"/>
-            </a:fillRef>
-            <a:effectRef idx="0">
-              <a:schemeClr val="accent1"/>
-            </a:effectRef>
-            <a:fontRef idx="minor">
-              <a:schemeClr val="lt1"/>
-            </a:fontRef>
-          </p:style>
-          <p:txBody>
-            <a:bodyPr lIns="0" tIns="0" rIns="0" bIns="0" rtlCol="0" anchor="ctr"/>
-            <a:lstStyle/>
-            <a:p>
-              <a:pPr algn="ctr"/>
-              <a:endParaRPr lang="en-US"/>
-            </a:p>
-          </p:txBody>
-        </p:sp>
-        <p:sp>
-          <p:nvSpPr>
-            <p:cNvPr id="9" name="TextBox 8"/>
-            <p:cNvSpPr txBox="1"/>
-            <p:nvPr/>
-          </p:nvSpPr>
-          <p:spPr>
-            <a:xfrm>
-              <a:off x="2585347" y="629763"/>
-              <a:ext cx="7188519" cy="584775"/>
-            </a:xfrm>
-            <a:prstGeom prst="rect">
-              <a:avLst/>
-            </a:prstGeom>
-            <a:solidFill>
-              <a:schemeClr val="bg1"/>
-            </a:solidFill>
-          </p:spPr>
-          <p:txBody>
-            <a:bodyPr wrap="square" rtlCol="0">
-              <a:spAutoFit/>
-            </a:bodyPr>
-            <a:lstStyle/>
-            <a:p>
-              <a:pPr algn="ctr"/>
-              <a:r>
-                <a:rPr lang="en-US" sz="1600" dirty="0" smtClean="0">
+          </p:grpSpPr>
+          <p:sp>
+            <p:nvSpPr>
+              <p:cNvPr id="51" name="Rectangle 50"/>
+              <p:cNvSpPr/>
+              <p:nvPr/>
+            </p:nvSpPr>
+            <p:spPr>
+              <a:xfrm>
+                <a:off x="1640717" y="-1214162"/>
+                <a:ext cx="9043416" cy="9889982"/>
+              </a:xfrm>
+              <a:prstGeom prst="rect">
+                <a:avLst/>
+              </a:prstGeom>
+              <a:solidFill>
+                <a:schemeClr val="bg1"/>
+              </a:solidFill>
+              <a:ln>
+                <a:noFill/>
+              </a:ln>
+            </p:spPr>
+            <p:style>
+              <a:lnRef idx="2">
+                <a:schemeClr val="accent1">
+                  <a:shade val="50000"/>
+                </a:schemeClr>
+              </a:lnRef>
+              <a:fillRef idx="1">
+                <a:schemeClr val="accent1"/>
+              </a:fillRef>
+              <a:effectRef idx="0">
+                <a:schemeClr val="accent1"/>
+              </a:effectRef>
+              <a:fontRef idx="minor">
+                <a:schemeClr val="lt1"/>
+              </a:fontRef>
+            </p:style>
+            <p:txBody>
+              <a:bodyPr lIns="0" tIns="0" rIns="0" bIns="0" rtlCol="0" anchor="ctr"/>
+              <a:lstStyle/>
+              <a:p>
+                <a:pPr algn="ctr"/>
+                <a:endParaRPr lang="en-US"/>
+              </a:p>
+            </p:txBody>
+          </p:sp>
+          <p:sp>
+            <p:nvSpPr>
+              <p:cNvPr id="9" name="TextBox 8"/>
+              <p:cNvSpPr txBox="1"/>
+              <p:nvPr/>
+            </p:nvSpPr>
+            <p:spPr>
+              <a:xfrm>
+                <a:off x="2585347" y="629763"/>
+                <a:ext cx="7188519" cy="584775"/>
+              </a:xfrm>
+              <a:prstGeom prst="rect">
+                <a:avLst/>
+              </a:prstGeom>
+              <a:solidFill>
+                <a:schemeClr val="bg1"/>
+              </a:solidFill>
+            </p:spPr>
+            <p:txBody>
+              <a:bodyPr wrap="square" rtlCol="0">
+                <a:spAutoFit/>
+              </a:bodyPr>
+              <a:lstStyle/>
+              <a:p>
+                <a:pPr algn="ctr"/>
+                <a:r>
+                  <a:rPr lang="en-US" sz="1600" dirty="0" smtClean="0">
+                    <a:latin typeface="Arial" charset="0"/>
+                    <a:ea typeface="Arial" charset="0"/>
+                    <a:cs typeface="Arial" charset="0"/>
+                  </a:rPr>
+                  <a:t>The Research Bazaar is a worldwide festival promoting the digital literacy emerging at the center of modern research. Check us out @</a:t>
+                </a:r>
+                <a:r>
+                  <a:rPr lang="en-US" sz="1600" dirty="0" err="1" smtClean="0">
+                    <a:latin typeface="Arial" charset="0"/>
+                    <a:ea typeface="Arial" charset="0"/>
+                    <a:cs typeface="Arial" charset="0"/>
+                  </a:rPr>
+                  <a:t>resbazaz</a:t>
+                </a:r>
+                <a:endParaRPr lang="en-US" sz="1600" dirty="0">
                   <a:latin typeface="Arial" charset="0"/>
                   <a:ea typeface="Arial" charset="0"/>
                   <a:cs typeface="Arial" charset="0"/>
-                </a:rPr>
-                <a:t>The Research Bazaar is a worldwide festival promoting the digital literacy emerging at the center of modern research. Check us out @</a:t>
-              </a:r>
-              <a:r>
-                <a:rPr lang="en-US" sz="1600" dirty="0" err="1" smtClean="0">
+                </a:endParaRPr>
+              </a:p>
+            </p:txBody>
+          </p:sp>
+          <p:pic>
+            <p:nvPicPr>
+              <p:cNvPr id="14" name="Picture 13"/>
+              <p:cNvPicPr>
+                <a:picLocks noChangeAspect="1"/>
+              </p:cNvPicPr>
+              <p:nvPr/>
+            </p:nvPicPr>
+            <p:blipFill>
+              <a:blip r:embed="rId3">
+                <a:biLevel thresh="75000"/>
+                <a:extLst>
+                  <a:ext uri="{28A0092B-C50C-407E-A947-70E740481C1C}">
+                    <a14:useLocalDpi xmlns:a14="http://schemas.microsoft.com/office/drawing/2010/main" val="0"/>
+                  </a:ext>
+                </a:extLst>
+              </a:blip>
+              <a:stretch>
+                <a:fillRect/>
+              </a:stretch>
+            </p:blipFill>
+            <p:spPr>
+              <a:xfrm>
+                <a:off x="2687604" y="-1234136"/>
+                <a:ext cx="7168312" cy="1805186"/>
+              </a:xfrm>
+              <a:prstGeom prst="rect">
+                <a:avLst/>
+              </a:prstGeom>
+              <a:solidFill>
+                <a:schemeClr val="bg1"/>
+              </a:solidFill>
+            </p:spPr>
+          </p:pic>
+          <p:sp>
+            <p:nvSpPr>
+              <p:cNvPr id="23" name="TextBox 22"/>
+              <p:cNvSpPr txBox="1"/>
+              <p:nvPr/>
+            </p:nvSpPr>
+            <p:spPr>
+              <a:xfrm>
+                <a:off x="1740911" y="8244934"/>
+                <a:ext cx="8877390" cy="430886"/>
+              </a:xfrm>
+              <a:prstGeom prst="rect">
+                <a:avLst/>
+              </a:prstGeom>
+              <a:solidFill>
+                <a:schemeClr val="bg1"/>
+              </a:solidFill>
+            </p:spPr>
+            <p:txBody>
+              <a:bodyPr wrap="square" rtlCol="0">
+                <a:spAutoFit/>
+              </a:bodyPr>
+              <a:lstStyle/>
+              <a:p>
+                <a:r>
+                  <a:rPr lang="en-US" sz="1100" dirty="0" smtClean="0">
+                    <a:latin typeface="Arial" charset="0"/>
+                    <a:ea typeface="Arial" charset="0"/>
+                    <a:cs typeface="Arial" charset="0"/>
+                  </a:rPr>
+                  <a:t>* </a:t>
+                </a:r>
+                <a:r>
+                  <a:rPr lang="en-US" sz="1000" dirty="0" smtClean="0">
+                    <a:latin typeface="Arial" charset="0"/>
+                    <a:ea typeface="Arial" charset="0"/>
+                    <a:cs typeface="Arial" charset="0"/>
+                  </a:rPr>
+                  <a:t>No beverages are provided. But it’s still fun and fairly cheap one way or the other.</a:t>
+                </a:r>
+                <a:r>
+                  <a:rPr lang="en-US" sz="1000" baseline="30000" dirty="0" smtClean="0">
+                    <a:latin typeface="Arial" charset="0"/>
+                    <a:ea typeface="Arial" charset="0"/>
+                    <a:cs typeface="Arial" charset="0"/>
+                  </a:rPr>
+                  <a:t>◆</a:t>
+                </a:r>
+                <a:endParaRPr lang="en-US" sz="1000" baseline="30000" dirty="0">
                   <a:latin typeface="Arial" charset="0"/>
                   <a:ea typeface="Arial" charset="0"/>
                   <a:cs typeface="Arial" charset="0"/>
-                </a:rPr>
-                <a:t>resbazaz</a:t>
-              </a:r>
-              <a:endParaRPr lang="en-US" sz="1600" dirty="0">
-                <a:latin typeface="Arial" charset="0"/>
-                <a:ea typeface="Arial" charset="0"/>
-                <a:cs typeface="Arial" charset="0"/>
-              </a:endParaRPr>
-            </a:p>
-          </p:txBody>
-        </p:sp>
+                </a:endParaRPr>
+              </a:p>
+              <a:p>
+                <a:r>
+                  <a:rPr lang="en-US" sz="1000" baseline="30000" dirty="0" smtClean="0">
+                    <a:latin typeface="Arial" charset="0"/>
+                    <a:ea typeface="Arial" charset="0"/>
+                    <a:cs typeface="Arial" charset="0"/>
+                  </a:rPr>
+                  <a:t>◆</a:t>
+                </a:r>
+                <a:r>
+                  <a:rPr lang="en-US" sz="1000" dirty="0" smtClean="0">
+                    <a:latin typeface="Arial" charset="0"/>
+                    <a:ea typeface="Arial" charset="0"/>
+                    <a:cs typeface="Arial" charset="0"/>
+                  </a:rPr>
+                  <a:t> Neither fun nor cheap is a guarantee. But if you are still reading this, and it’s funny: we feel more confident about the first part</a:t>
+                </a:r>
+                <a:r>
+                  <a:rPr lang="en-US" sz="1100" dirty="0" smtClean="0">
+                    <a:latin typeface="Arial" charset="0"/>
+                    <a:ea typeface="Arial" charset="0"/>
+                    <a:cs typeface="Arial" charset="0"/>
+                  </a:rPr>
+                  <a:t>.</a:t>
+                </a:r>
+                <a:endParaRPr lang="en-US" sz="1100" dirty="0">
+                  <a:latin typeface="Arial" charset="0"/>
+                  <a:ea typeface="Arial" charset="0"/>
+                  <a:cs typeface="Arial" charset="0"/>
+                </a:endParaRPr>
+              </a:p>
+            </p:txBody>
+          </p:sp>
+          <p:sp>
+            <p:nvSpPr>
+              <p:cNvPr id="10" name="TextBox 9"/>
+              <p:cNvSpPr txBox="1"/>
+              <p:nvPr/>
+            </p:nvSpPr>
+            <p:spPr>
+              <a:xfrm>
+                <a:off x="1740911" y="7445312"/>
+                <a:ext cx="4284769" cy="830997"/>
+              </a:xfrm>
+              <a:prstGeom prst="rect">
+                <a:avLst/>
+              </a:prstGeom>
+              <a:solidFill>
+                <a:schemeClr val="bg1"/>
+              </a:solidFill>
+            </p:spPr>
+            <p:txBody>
+              <a:bodyPr wrap="square" rtlCol="0">
+                <a:spAutoFit/>
+              </a:bodyPr>
+              <a:lstStyle/>
+              <a:p>
+                <a:pPr algn="ctr"/>
+                <a:r>
+                  <a:rPr lang="en-US" sz="1600" dirty="0" smtClean="0">
+                    <a:latin typeface="Arial" charset="0"/>
+                    <a:ea typeface="Arial" charset="0"/>
+                    <a:cs typeface="Arial" charset="0"/>
+                  </a:rPr>
+                  <a:t>Weekly, Tuesdays 8-10 </a:t>
+                </a:r>
+              </a:p>
+              <a:p>
+                <a:pPr algn="ctr"/>
+                <a:r>
+                  <a:rPr lang="en-US" sz="1600" dirty="0" smtClean="0">
+                    <a:latin typeface="Arial" charset="0"/>
+                    <a:ea typeface="Arial" charset="0"/>
+                    <a:cs typeface="Arial" charset="0"/>
+                  </a:rPr>
+                  <a:t>Nucleus Café, </a:t>
+                </a:r>
+                <a:r>
+                  <a:rPr lang="en-US" sz="1600" dirty="0">
+                    <a:latin typeface="Arial" charset="0"/>
+                    <a:ea typeface="Arial" charset="0"/>
+                    <a:cs typeface="Arial" charset="0"/>
+                  </a:rPr>
+                  <a:t>(Keating Building)</a:t>
+                </a:r>
+              </a:p>
+              <a:p>
+                <a:pPr algn="ctr"/>
+                <a:r>
+                  <a:rPr lang="en-US" sz="1600" dirty="0">
+                    <a:latin typeface="Arial" charset="0"/>
+                    <a:ea typeface="Arial" charset="0"/>
+                    <a:cs typeface="Arial" charset="0"/>
+                  </a:rPr>
+                  <a:t>1657 E Helen St</a:t>
+                </a:r>
+              </a:p>
+            </p:txBody>
+          </p:sp>
+          <p:sp>
+            <p:nvSpPr>
+              <p:cNvPr id="11" name="TextBox 10"/>
+              <p:cNvSpPr txBox="1"/>
+              <p:nvPr/>
+            </p:nvSpPr>
+            <p:spPr>
+              <a:xfrm>
+                <a:off x="6539949" y="7445314"/>
+                <a:ext cx="4078352" cy="830997"/>
+              </a:xfrm>
+              <a:prstGeom prst="rect">
+                <a:avLst/>
+              </a:prstGeom>
+              <a:solidFill>
+                <a:schemeClr val="bg1"/>
+              </a:solidFill>
+            </p:spPr>
+            <p:txBody>
+              <a:bodyPr wrap="square" rtlCol="0">
+                <a:spAutoFit/>
+              </a:bodyPr>
+              <a:lstStyle/>
+              <a:p>
+                <a:pPr algn="ctr"/>
+                <a:r>
+                  <a:rPr lang="en-US" sz="1600" dirty="0" smtClean="0">
+                    <a:latin typeface="Arial" charset="0"/>
+                    <a:ea typeface="Arial" charset="0"/>
+                    <a:cs typeface="Arial" charset="0"/>
+                  </a:rPr>
+                  <a:t>Weekly, Thursdays 4-7 </a:t>
+                </a:r>
+              </a:p>
+              <a:p>
+                <a:pPr algn="ctr"/>
+                <a:r>
+                  <a:rPr lang="en-US" sz="1600" dirty="0">
+                    <a:latin typeface="Arial" charset="0"/>
+                    <a:ea typeface="Arial" charset="0"/>
+                    <a:cs typeface="Arial" charset="0"/>
+                  </a:rPr>
+                  <a:t>Pasco (Main Gate Square) </a:t>
+                </a:r>
+              </a:p>
+              <a:p>
+                <a:pPr algn="ctr"/>
+                <a:r>
+                  <a:rPr lang="en-US" sz="1600" dirty="0">
+                    <a:latin typeface="Arial" charset="0"/>
+                    <a:ea typeface="Arial" charset="0"/>
+                    <a:cs typeface="Arial" charset="0"/>
+                  </a:rPr>
+                  <a:t>820 E University Blvd</a:t>
+                </a:r>
+              </a:p>
+            </p:txBody>
+          </p:sp>
+          <p:sp>
+            <p:nvSpPr>
+              <p:cNvPr id="12" name="TextBox 11"/>
+              <p:cNvSpPr txBox="1"/>
+              <p:nvPr/>
+            </p:nvSpPr>
+            <p:spPr>
+              <a:xfrm>
+                <a:off x="7518578" y="2620378"/>
+                <a:ext cx="2121093" cy="276999"/>
+              </a:xfrm>
+              <a:prstGeom prst="rect">
+                <a:avLst/>
+              </a:prstGeom>
+              <a:noFill/>
+            </p:spPr>
+            <p:txBody>
+              <a:bodyPr wrap="none" tIns="0" bIns="0" rtlCol="0">
+                <a:spAutoFit/>
+              </a:bodyPr>
+              <a:lstStyle/>
+              <a:p>
+                <a:r>
+                  <a:rPr lang="en-US" smtClean="0">
+                    <a:latin typeface="Arial" charset="0"/>
+                    <a:ea typeface="Arial" charset="0"/>
+                    <a:cs typeface="Arial" charset="0"/>
+                  </a:rPr>
+                  <a:t>Not into mornings?</a:t>
+                </a:r>
+                <a:endParaRPr lang="en-US">
+                  <a:latin typeface="Arial" charset="0"/>
+                  <a:ea typeface="Arial" charset="0"/>
+                  <a:cs typeface="Arial" charset="0"/>
+                </a:endParaRPr>
+              </a:p>
+            </p:txBody>
+          </p:sp>
+          <p:sp>
+            <p:nvSpPr>
+              <p:cNvPr id="13" name="TextBox 12"/>
+              <p:cNvSpPr txBox="1"/>
+              <p:nvPr/>
+            </p:nvSpPr>
+            <p:spPr>
+              <a:xfrm>
+                <a:off x="2598329" y="2620378"/>
+                <a:ext cx="2569934" cy="276999"/>
+              </a:xfrm>
+              <a:prstGeom prst="rect">
+                <a:avLst/>
+              </a:prstGeom>
+              <a:noFill/>
+            </p:spPr>
+            <p:txBody>
+              <a:bodyPr wrap="none" tIns="0" bIns="0" rtlCol="0">
+                <a:spAutoFit/>
+              </a:bodyPr>
+              <a:lstStyle/>
+              <a:p>
+                <a:r>
+                  <a:rPr lang="en-US" dirty="0" smtClean="0">
+                    <a:latin typeface="Arial" charset="0"/>
+                    <a:ea typeface="Arial" charset="0"/>
+                    <a:cs typeface="Arial" charset="0"/>
+                  </a:rPr>
+                  <a:t>Not into the bar scene?</a:t>
+                </a:r>
+                <a:endParaRPr lang="en-US" dirty="0">
+                  <a:latin typeface="Arial" charset="0"/>
+                  <a:ea typeface="Arial" charset="0"/>
+                  <a:cs typeface="Arial" charset="0"/>
+                </a:endParaRPr>
+              </a:p>
+            </p:txBody>
+          </p:sp>
+          <p:pic>
+            <p:nvPicPr>
+              <p:cNvPr id="16" name="Picture 15"/>
+              <p:cNvPicPr>
+                <a:picLocks noChangeAspect="1"/>
+              </p:cNvPicPr>
+              <p:nvPr/>
+            </p:nvPicPr>
+            <p:blipFill rotWithShape="1">
+              <a:blip r:embed="rId4">
+                <a:extLst>
+                  <a:ext uri="{28A0092B-C50C-407E-A947-70E740481C1C}">
+                    <a14:useLocalDpi xmlns:a14="http://schemas.microsoft.com/office/drawing/2010/main" val="0"/>
+                  </a:ext>
+                </a:extLst>
+              </a:blip>
+              <a:srcRect b="15710"/>
+              <a:stretch/>
+            </p:blipFill>
+            <p:spPr>
+              <a:xfrm>
+                <a:off x="6545276" y="2979606"/>
+                <a:ext cx="4073025" cy="4442895"/>
+              </a:xfrm>
+              <a:prstGeom prst="rect">
+                <a:avLst/>
+              </a:prstGeom>
+              <a:ln>
+                <a:solidFill>
+                  <a:schemeClr val="tx1"/>
+                </a:solidFill>
+              </a:ln>
+            </p:spPr>
+          </p:pic>
+          <p:pic>
+            <p:nvPicPr>
+              <p:cNvPr id="17" name="Picture 16"/>
+              <p:cNvPicPr>
+                <a:picLocks noChangeAspect="1"/>
+              </p:cNvPicPr>
+              <p:nvPr/>
+            </p:nvPicPr>
+            <p:blipFill rotWithShape="1">
+              <a:blip r:embed="rId5">
+                <a:extLst>
+                  <a:ext uri="{28A0092B-C50C-407E-A947-70E740481C1C}">
+                    <a14:useLocalDpi xmlns:a14="http://schemas.microsoft.com/office/drawing/2010/main" val="0"/>
+                  </a:ext>
+                </a:extLst>
+              </a:blip>
+              <a:srcRect b="21342"/>
+              <a:stretch/>
+            </p:blipFill>
+            <p:spPr>
+              <a:xfrm>
+                <a:off x="1700988" y="2979606"/>
+                <a:ext cx="4364617" cy="4442895"/>
+              </a:xfrm>
+              <a:prstGeom prst="rect">
+                <a:avLst/>
+              </a:prstGeom>
+              <a:ln>
+                <a:solidFill>
+                  <a:schemeClr val="tx1"/>
+                </a:solidFill>
+              </a:ln>
+            </p:spPr>
+          </p:pic>
+          <p:sp>
+            <p:nvSpPr>
+              <p:cNvPr id="21" name="TextBox 20"/>
+              <p:cNvSpPr txBox="1"/>
+              <p:nvPr/>
+            </p:nvSpPr>
+            <p:spPr>
+              <a:xfrm>
+                <a:off x="1700988" y="1343259"/>
+                <a:ext cx="8917313" cy="677109"/>
+              </a:xfrm>
+              <a:prstGeom prst="rect">
+                <a:avLst/>
+              </a:prstGeom>
+              <a:solidFill>
+                <a:schemeClr val="bg1"/>
+              </a:solidFill>
+            </p:spPr>
+            <p:txBody>
+              <a:bodyPr wrap="square" lIns="0" rIns="0" rtlCol="0">
+                <a:spAutoFit/>
+              </a:bodyPr>
+              <a:lstStyle/>
+              <a:p>
+                <a:pPr algn="ctr"/>
+                <a:r>
+                  <a:rPr lang="en-US" sz="1900" b="1" dirty="0" smtClean="0">
+                    <a:latin typeface="Adobe Hebrew" charset="0"/>
+                    <a:ea typeface="Adobe Hebrew" charset="0"/>
+                    <a:cs typeface="Adobe Hebrew" charset="0"/>
+                  </a:rPr>
+                  <a:t>Need help with science or computers? Tired of quietly suffering trying to figure it out? Come hang out with us; it’s free!* Just want to hang out? Also free!*</a:t>
+                </a:r>
+                <a:endParaRPr lang="en-US" sz="1900" b="1" dirty="0">
+                  <a:latin typeface="Adobe Hebrew" charset="0"/>
+                  <a:ea typeface="Adobe Hebrew" charset="0"/>
+                  <a:cs typeface="Adobe Hebrew" charset="0"/>
+                </a:endParaRPr>
+              </a:p>
+            </p:txBody>
+          </p:sp>
+          <p:cxnSp>
+            <p:nvCxnSpPr>
+              <p:cNvPr id="34" name="Elbow Connector 33"/>
+              <p:cNvCxnSpPr>
+                <a:stCxn id="21" idx="2"/>
+                <a:endCxn id="13" idx="0"/>
+              </p:cNvCxnSpPr>
+              <p:nvPr/>
+            </p:nvCxnSpPr>
+            <p:spPr>
+              <a:xfrm rot="5400000">
+                <a:off x="4721466" y="1182199"/>
+                <a:ext cx="600009" cy="2276349"/>
+              </a:xfrm>
+              <a:prstGeom prst="bentConnector3">
+                <a:avLst>
+                  <a:gd name="adj1" fmla="val 50000"/>
+                </a:avLst>
+              </a:prstGeom>
+              <a:ln w="22225">
+                <a:solidFill>
+                  <a:schemeClr val="tx1"/>
+                </a:solidFill>
+                <a:tailEnd type="triangle"/>
+              </a:ln>
+            </p:spPr>
+            <p:style>
+              <a:lnRef idx="1">
+                <a:schemeClr val="accent1"/>
+              </a:lnRef>
+              <a:fillRef idx="0">
+                <a:schemeClr val="accent1"/>
+              </a:fillRef>
+              <a:effectRef idx="0">
+                <a:schemeClr val="accent1"/>
+              </a:effectRef>
+              <a:fontRef idx="minor">
+                <a:schemeClr val="tx1"/>
+              </a:fontRef>
+            </p:style>
+          </p:cxnSp>
+          <p:cxnSp>
+            <p:nvCxnSpPr>
+              <p:cNvPr id="35" name="Elbow Connector 34"/>
+              <p:cNvCxnSpPr>
+                <a:stCxn id="21" idx="2"/>
+                <a:endCxn id="12" idx="0"/>
+              </p:cNvCxnSpPr>
+              <p:nvPr/>
+            </p:nvCxnSpPr>
+            <p:spPr>
+              <a:xfrm rot="16200000" flipH="1">
+                <a:off x="7069380" y="1110633"/>
+                <a:ext cx="600009" cy="2419479"/>
+              </a:xfrm>
+              <a:prstGeom prst="bentConnector3">
+                <a:avLst>
+                  <a:gd name="adj1" fmla="val 50000"/>
+                </a:avLst>
+              </a:prstGeom>
+              <a:ln w="22225">
+                <a:solidFill>
+                  <a:schemeClr val="tx1"/>
+                </a:solidFill>
+                <a:tailEnd type="triangle"/>
+              </a:ln>
+            </p:spPr>
+            <p:style>
+              <a:lnRef idx="1">
+                <a:schemeClr val="accent1"/>
+              </a:lnRef>
+              <a:fillRef idx="0">
+                <a:schemeClr val="accent1"/>
+              </a:fillRef>
+              <a:effectRef idx="0">
+                <a:schemeClr val="accent1"/>
+              </a:effectRef>
+              <a:fontRef idx="minor">
+                <a:schemeClr val="tx1"/>
+              </a:fontRef>
+            </p:style>
+          </p:cxnSp>
+        </p:grpSp>
         <p:pic>
           <p:nvPicPr>
-            <p:cNvPr id="14" name="Picture 13"/>
+            <p:cNvPr id="1026" name="Picture 2" descr="ttps://image.freepik.com/free-icon/twitter-logo_318-40459.jpg"/>
             <p:cNvPicPr>
-              <a:picLocks noChangeAspect="1"/>
+              <a:picLocks noChangeAspect="1" noChangeArrowheads="1"/>
             </p:cNvPicPr>
             <p:nvPr/>
           </p:nvPicPr>
           <p:blipFill>
-            <a:blip r:embed="rId3">
-              <a:biLevel thresh="75000"/>
+            <a:blip r:embed="rId6">
               <a:extLst>
                 <a:ext uri="{28A0092B-C50C-407E-A947-70E740481C1C}">
                   <a14:useLocalDpi xmlns:a14="http://schemas.microsoft.com/office/drawing/2010/main" val="0"/>
                 </a:ext>
               </a:extLst>
             </a:blip>
+            <a:srcRect/>
             <a:stretch>
               <a:fillRect/>
             </a:stretch>
           </p:blipFill>
-          <p:spPr>
+          <p:spPr bwMode="auto">
             <a:xfrm>
-              <a:off x="2687604" y="-1234136"/>
-              <a:ext cx="7168312" cy="1805186"/>
-            </a:xfrm>
-            <a:prstGeom prst="rect">
-              <a:avLst/>
-            </a:prstGeom>
-            <a:solidFill>
-              <a:schemeClr val="bg1"/>
-            </a:solidFill>
-          </p:spPr>
-        </p:pic>
-        <p:sp>
-          <p:nvSpPr>
-            <p:cNvPr id="23" name="TextBox 22"/>
-            <p:cNvSpPr txBox="1"/>
-            <p:nvPr/>
-          </p:nvSpPr>
-          <p:spPr>
-            <a:xfrm>
-              <a:off x="1740911" y="8016334"/>
-              <a:ext cx="8877390" cy="430886"/>
-            </a:xfrm>
-            <a:prstGeom prst="rect">
-              <a:avLst/>
-            </a:prstGeom>
-            <a:solidFill>
-              <a:schemeClr val="bg1"/>
-            </a:solidFill>
-          </p:spPr>
-          <p:txBody>
-            <a:bodyPr wrap="square" rtlCol="0">
-              <a:spAutoFit/>
-            </a:bodyPr>
-            <a:lstStyle/>
-            <a:p>
-              <a:r>
-                <a:rPr lang="en-US" sz="1100" dirty="0" smtClean="0">
-                  <a:latin typeface="Arial" charset="0"/>
-                  <a:ea typeface="Arial" charset="0"/>
-                  <a:cs typeface="Arial" charset="0"/>
-                </a:rPr>
-                <a:t>* </a:t>
-              </a:r>
-              <a:r>
-                <a:rPr lang="en-US" sz="1000" dirty="0" smtClean="0">
-                  <a:latin typeface="Arial" charset="0"/>
-                  <a:ea typeface="Arial" charset="0"/>
-                  <a:cs typeface="Arial" charset="0"/>
-                </a:rPr>
-                <a:t>No beverages are provided. But it’s still fun and fairly cheap one way or the other.</a:t>
-              </a:r>
-              <a:r>
-                <a:rPr lang="en-US" sz="1000" baseline="30000" dirty="0" smtClean="0">
-                  <a:latin typeface="Arial" charset="0"/>
-                  <a:ea typeface="Arial" charset="0"/>
-                  <a:cs typeface="Arial" charset="0"/>
-                </a:rPr>
-                <a:t>◆</a:t>
-              </a:r>
-              <a:endParaRPr lang="en-US" sz="1000" baseline="30000" dirty="0">
-                <a:latin typeface="Arial" charset="0"/>
-                <a:ea typeface="Arial" charset="0"/>
-                <a:cs typeface="Arial" charset="0"/>
-              </a:endParaRPr>
-            </a:p>
-            <a:p>
-              <a:r>
-                <a:rPr lang="en-US" sz="1000" baseline="30000" dirty="0" smtClean="0">
-                  <a:latin typeface="Arial" charset="0"/>
-                  <a:ea typeface="Arial" charset="0"/>
-                  <a:cs typeface="Arial" charset="0"/>
-                </a:rPr>
-                <a:t>◆</a:t>
-              </a:r>
-              <a:r>
-                <a:rPr lang="en-US" sz="1000" dirty="0" smtClean="0">
-                  <a:latin typeface="Arial" charset="0"/>
-                  <a:ea typeface="Arial" charset="0"/>
-                  <a:cs typeface="Arial" charset="0"/>
-                </a:rPr>
-                <a:t> Neither fun nor cheap is a guarantee. But if you are still reading this, and it’s funny: we feel more confident about the first part</a:t>
-              </a:r>
-              <a:r>
-                <a:rPr lang="en-US" sz="1100" dirty="0" smtClean="0">
-                  <a:latin typeface="Arial" charset="0"/>
-                  <a:ea typeface="Arial" charset="0"/>
-                  <a:cs typeface="Arial" charset="0"/>
-                </a:rPr>
-                <a:t>.</a:t>
-              </a:r>
-              <a:endParaRPr lang="en-US" sz="1100" dirty="0">
-                <a:latin typeface="Arial" charset="0"/>
-                <a:ea typeface="Arial" charset="0"/>
-                <a:cs typeface="Arial" charset="0"/>
-              </a:endParaRPr>
-            </a:p>
-          </p:txBody>
-        </p:sp>
-        <p:sp>
-          <p:nvSpPr>
-            <p:cNvPr id="10" name="TextBox 9"/>
-            <p:cNvSpPr txBox="1"/>
-            <p:nvPr/>
-          </p:nvSpPr>
-          <p:spPr>
-            <a:xfrm>
-              <a:off x="1740911" y="7445312"/>
-              <a:ext cx="4284769" cy="584775"/>
-            </a:xfrm>
-            <a:prstGeom prst="rect">
-              <a:avLst/>
-            </a:prstGeom>
-            <a:solidFill>
-              <a:schemeClr val="bg1"/>
-            </a:solidFill>
-          </p:spPr>
-          <p:txBody>
-            <a:bodyPr wrap="square" rtlCol="0">
-              <a:spAutoFit/>
-            </a:bodyPr>
-            <a:lstStyle/>
-            <a:p>
-              <a:pPr algn="ctr"/>
-              <a:r>
-                <a:rPr lang="en-US" sz="1600" dirty="0" smtClean="0">
-                  <a:latin typeface="Arial" charset="0"/>
-                  <a:ea typeface="Arial" charset="0"/>
-                  <a:cs typeface="Arial" charset="0"/>
-                </a:rPr>
-                <a:t>Weekly, Tuesdays 8-10 </a:t>
-              </a:r>
-            </a:p>
-            <a:p>
-              <a:pPr algn="ctr"/>
-              <a:r>
-                <a:rPr lang="en-US" sz="1600" dirty="0" smtClean="0">
-                  <a:latin typeface="Arial" charset="0"/>
-                  <a:ea typeface="Arial" charset="0"/>
-                  <a:cs typeface="Arial" charset="0"/>
-                </a:rPr>
-                <a:t>Nucleus Café, Keating Building</a:t>
-              </a:r>
-              <a:endParaRPr lang="en-US" sz="1600" dirty="0">
-                <a:latin typeface="Arial" charset="0"/>
-                <a:ea typeface="Arial" charset="0"/>
-                <a:cs typeface="Arial" charset="0"/>
-              </a:endParaRPr>
-            </a:p>
-          </p:txBody>
-        </p:sp>
-        <p:sp>
-          <p:nvSpPr>
-            <p:cNvPr id="11" name="TextBox 10"/>
-            <p:cNvSpPr txBox="1"/>
-            <p:nvPr/>
-          </p:nvSpPr>
-          <p:spPr>
-            <a:xfrm>
-              <a:off x="6539949" y="7445314"/>
-              <a:ext cx="4078352" cy="584775"/>
-            </a:xfrm>
-            <a:prstGeom prst="rect">
-              <a:avLst/>
-            </a:prstGeom>
-            <a:solidFill>
-              <a:schemeClr val="bg1"/>
-            </a:solidFill>
-          </p:spPr>
-          <p:txBody>
-            <a:bodyPr wrap="square" rtlCol="0">
-              <a:spAutoFit/>
-            </a:bodyPr>
-            <a:lstStyle/>
-            <a:p>
-              <a:pPr algn="ctr"/>
-              <a:r>
-                <a:rPr lang="en-US" sz="1600" dirty="0" smtClean="0">
-                  <a:latin typeface="Arial" charset="0"/>
-                  <a:ea typeface="Arial" charset="0"/>
-                  <a:cs typeface="Arial" charset="0"/>
-                </a:rPr>
-                <a:t>Weekly, Thursdays 4-7 </a:t>
-              </a:r>
-            </a:p>
-            <a:p>
-              <a:pPr algn="ctr"/>
-              <a:r>
-                <a:rPr lang="en-US" sz="1600" dirty="0" smtClean="0">
-                  <a:latin typeface="Arial" charset="0"/>
-                  <a:ea typeface="Arial" charset="0"/>
-                  <a:cs typeface="Arial" charset="0"/>
-                </a:rPr>
-                <a:t>Gentle Ben’s Brewing Upstairs</a:t>
-              </a:r>
-              <a:endParaRPr lang="en-US" sz="1600" dirty="0">
-                <a:latin typeface="Arial" charset="0"/>
-                <a:ea typeface="Arial" charset="0"/>
-                <a:cs typeface="Arial" charset="0"/>
-              </a:endParaRPr>
-            </a:p>
-          </p:txBody>
-        </p:sp>
-        <p:sp>
-          <p:nvSpPr>
-            <p:cNvPr id="12" name="TextBox 11"/>
-            <p:cNvSpPr txBox="1"/>
-            <p:nvPr/>
-          </p:nvSpPr>
-          <p:spPr>
-            <a:xfrm>
-              <a:off x="7518578" y="2620378"/>
-              <a:ext cx="2121093" cy="276999"/>
+              <a:off x="9309025" y="918323"/>
+              <a:ext cx="330646" cy="330646"/>
             </a:xfrm>
             <a:prstGeom prst="rect">
               <a:avLst/>
             </a:prstGeom>
             <a:noFill/>
-          </p:spPr>
-          <p:txBody>
-            <a:bodyPr wrap="none" tIns="0" bIns="0" rtlCol="0">
-              <a:spAutoFit/>
-            </a:bodyPr>
-            <a:lstStyle/>
-            <a:p>
-              <a:r>
-                <a:rPr lang="en-US" smtClean="0">
-                  <a:latin typeface="Arial" charset="0"/>
-                  <a:ea typeface="Arial" charset="0"/>
-                  <a:cs typeface="Arial" charset="0"/>
-                </a:rPr>
-                <a:t>Not into mornings?</a:t>
-              </a:r>
-              <a:endParaRPr lang="en-US">
-                <a:latin typeface="Arial" charset="0"/>
-                <a:ea typeface="Arial" charset="0"/>
-                <a:cs typeface="Arial" charset="0"/>
-              </a:endParaRPr>
-            </a:p>
-          </p:txBody>
-        </p:sp>
-        <p:sp>
-          <p:nvSpPr>
-            <p:cNvPr id="13" name="TextBox 12"/>
-            <p:cNvSpPr txBox="1"/>
-            <p:nvPr/>
-          </p:nvSpPr>
-          <p:spPr>
-            <a:xfrm>
-              <a:off x="2598329" y="2620378"/>
-              <a:ext cx="2569934" cy="276999"/>
-            </a:xfrm>
-            <a:prstGeom prst="rect">
-              <a:avLst/>
-            </a:prstGeom>
-            <a:noFill/>
-          </p:spPr>
-          <p:txBody>
-            <a:bodyPr wrap="none" tIns="0" bIns="0" rtlCol="0">
-              <a:spAutoFit/>
-            </a:bodyPr>
-            <a:lstStyle/>
-            <a:p>
-              <a:r>
-                <a:rPr lang="en-US" dirty="0" smtClean="0">
-                  <a:latin typeface="Arial" charset="0"/>
-                  <a:ea typeface="Arial" charset="0"/>
-                  <a:cs typeface="Arial" charset="0"/>
-                </a:rPr>
-                <a:t>Not into the bar scene?</a:t>
-              </a:r>
-              <a:endParaRPr lang="en-US" dirty="0">
-                <a:latin typeface="Arial" charset="0"/>
-                <a:ea typeface="Arial" charset="0"/>
-                <a:cs typeface="Arial" charset="0"/>
-              </a:endParaRPr>
-            </a:p>
-          </p:txBody>
-        </p:sp>
-        <p:pic>
-          <p:nvPicPr>
-            <p:cNvPr id="16" name="Picture 15"/>
-            <p:cNvPicPr>
-              <a:picLocks noChangeAspect="1"/>
-            </p:cNvPicPr>
-            <p:nvPr/>
-          </p:nvPicPr>
-          <p:blipFill rotWithShape="1">
-            <a:blip r:embed="rId4">
-              <a:extLst>
-                <a:ext uri="{28A0092B-C50C-407E-A947-70E740481C1C}">
-                  <a14:useLocalDpi xmlns:a14="http://schemas.microsoft.com/office/drawing/2010/main" val="0"/>
-                </a:ext>
-              </a:extLst>
-            </a:blip>
-            <a:srcRect b="15710"/>
-            <a:stretch/>
-          </p:blipFill>
-          <p:spPr>
-            <a:xfrm>
-              <a:off x="6545276" y="2979606"/>
-              <a:ext cx="4073025" cy="4442895"/>
-            </a:xfrm>
-            <a:prstGeom prst="rect">
-              <a:avLst/>
-            </a:prstGeom>
-            <a:ln>
-              <a:solidFill>
-                <a:schemeClr val="tx1"/>
-              </a:solidFill>
-            </a:ln>
+            <a:extLst>
+              <a:ext uri="{909E8E84-426E-40DD-AFC4-6F175D3DCCD1}">
+                <a14:hiddenFill xmlns:a14="http://schemas.microsoft.com/office/drawing/2010/main">
+                  <a:solidFill>
+                    <a:srgbClr val="FFFFFF"/>
+                  </a:solidFill>
+                </a14:hiddenFill>
+              </a:ext>
+            </a:extLst>
           </p:spPr>
         </p:pic>
-        <p:pic>
-          <p:nvPicPr>
-            <p:cNvPr id="17" name="Picture 16"/>
-            <p:cNvPicPr>
-              <a:picLocks noChangeAspect="1"/>
-            </p:cNvPicPr>
-            <p:nvPr/>
-          </p:nvPicPr>
-          <p:blipFill rotWithShape="1">
-            <a:blip r:embed="rId5">
-              <a:extLst>
-                <a:ext uri="{28A0092B-C50C-407E-A947-70E740481C1C}">
-                  <a14:useLocalDpi xmlns:a14="http://schemas.microsoft.com/office/drawing/2010/main" val="0"/>
-                </a:ext>
-              </a:extLst>
-            </a:blip>
-            <a:srcRect b="21342"/>
-            <a:stretch/>
-          </p:blipFill>
-          <p:spPr>
-            <a:xfrm>
-              <a:off x="1700988" y="2979606"/>
-              <a:ext cx="4364617" cy="4442895"/>
-            </a:xfrm>
-            <a:prstGeom prst="rect">
-              <a:avLst/>
-            </a:prstGeom>
-            <a:ln>
-              <a:solidFill>
-                <a:schemeClr val="tx1"/>
-              </a:solidFill>
-            </a:ln>
-          </p:spPr>
-        </p:pic>
-        <p:sp>
-          <p:nvSpPr>
-            <p:cNvPr id="21" name="TextBox 20"/>
-            <p:cNvSpPr txBox="1"/>
-            <p:nvPr/>
-          </p:nvSpPr>
-          <p:spPr>
-            <a:xfrm>
-              <a:off x="1700988" y="1343259"/>
-              <a:ext cx="8917313" cy="677109"/>
-            </a:xfrm>
-            <a:prstGeom prst="rect">
-              <a:avLst/>
-            </a:prstGeom>
-            <a:solidFill>
-              <a:schemeClr val="bg1"/>
-            </a:solidFill>
-          </p:spPr>
-          <p:txBody>
-            <a:bodyPr wrap="square" lIns="0" rIns="0" rtlCol="0">
-              <a:spAutoFit/>
-            </a:bodyPr>
-            <a:lstStyle/>
-            <a:p>
-              <a:pPr algn="ctr"/>
-              <a:r>
-                <a:rPr lang="en-US" sz="1900" b="1" dirty="0" smtClean="0">
-                  <a:latin typeface="Adobe Hebrew" charset="0"/>
-                  <a:ea typeface="Adobe Hebrew" charset="0"/>
-                  <a:cs typeface="Adobe Hebrew" charset="0"/>
-                </a:rPr>
-                <a:t>Need help with science or computers? Tired of quietly suffering trying to figure it out? Come hang out with us; it’s free!* Just want to hang out? Also free!*</a:t>
-              </a:r>
-              <a:endParaRPr lang="en-US" sz="1900" b="1" dirty="0">
-                <a:latin typeface="Adobe Hebrew" charset="0"/>
-                <a:ea typeface="Adobe Hebrew" charset="0"/>
-                <a:cs typeface="Adobe Hebrew" charset="0"/>
-              </a:endParaRPr>
-            </a:p>
-          </p:txBody>
-        </p:sp>
-        <p:cxnSp>
-          <p:nvCxnSpPr>
-            <p:cNvPr id="34" name="Elbow Connector 33"/>
-            <p:cNvCxnSpPr>
-              <a:stCxn id="21" idx="2"/>
-              <a:endCxn id="13" idx="0"/>
-            </p:cNvCxnSpPr>
-            <p:nvPr/>
-          </p:nvCxnSpPr>
-          <p:spPr>
-            <a:xfrm rot="5400000">
-              <a:off x="4721466" y="1182199"/>
-              <a:ext cx="600009" cy="2276349"/>
-            </a:xfrm>
-            <a:prstGeom prst="bentConnector3">
-              <a:avLst>
-                <a:gd name="adj1" fmla="val 50000"/>
-              </a:avLst>
-            </a:prstGeom>
-            <a:ln w="22225">
-              <a:solidFill>
-                <a:schemeClr val="tx1"/>
-              </a:solidFill>
-              <a:tailEnd type="triangle"/>
-            </a:ln>
-          </p:spPr>
-          <p:style>
-            <a:lnRef idx="1">
-              <a:schemeClr val="accent1"/>
-            </a:lnRef>
-            <a:fillRef idx="0">
-              <a:schemeClr val="accent1"/>
-            </a:fillRef>
-            <a:effectRef idx="0">
-              <a:schemeClr val="accent1"/>
-            </a:effectRef>
-            <a:fontRef idx="minor">
-              <a:schemeClr val="tx1"/>
-            </a:fontRef>
-          </p:style>
-        </p:cxnSp>
-        <p:cxnSp>
-          <p:nvCxnSpPr>
-            <p:cNvPr id="35" name="Elbow Connector 34"/>
-            <p:cNvCxnSpPr>
-              <a:stCxn id="21" idx="2"/>
-              <a:endCxn id="12" idx="0"/>
-            </p:cNvCxnSpPr>
-            <p:nvPr/>
-          </p:nvCxnSpPr>
-          <p:spPr>
-            <a:xfrm rot="16200000" flipH="1">
-              <a:off x="7069380" y="1110633"/>
-              <a:ext cx="600009" cy="2419479"/>
-            </a:xfrm>
-            <a:prstGeom prst="bentConnector3">
-              <a:avLst>
-                <a:gd name="adj1" fmla="val 50000"/>
-              </a:avLst>
-            </a:prstGeom>
-            <a:ln w="22225">
-              <a:solidFill>
-                <a:schemeClr val="tx1"/>
-              </a:solidFill>
-              <a:tailEnd type="triangle"/>
-            </a:ln>
-          </p:spPr>
-          <p:style>
-            <a:lnRef idx="1">
-              <a:schemeClr val="accent1"/>
-            </a:lnRef>
-            <a:fillRef idx="0">
-              <a:schemeClr val="accent1"/>
-            </a:fillRef>
-            <a:effectRef idx="0">
-              <a:schemeClr val="accent1"/>
-            </a:effectRef>
-            <a:fontRef idx="minor">
-              <a:schemeClr val="tx1"/>
-            </a:fontRef>
-          </p:style>
-        </p:cxnSp>
       </p:grpSp>
     </p:spTree>
     <p:extLst>
@@ -4522,238 +4618,6 @@
       </p:grpSpPr>
       <p:grpSp>
         <p:nvGrpSpPr>
-          <p:cNvPr id="15" name="Group 14"/>
-          <p:cNvGrpSpPr/>
-          <p:nvPr/>
-        </p:nvGrpSpPr>
-        <p:grpSpPr>
-          <a:xfrm>
-            <a:off x="6336451" y="1018308"/>
-            <a:ext cx="3211339" cy="4709984"/>
-            <a:chOff x="4561895" y="1010559"/>
-            <a:chExt cx="3211339" cy="4709984"/>
-          </a:xfrm>
-        </p:grpSpPr>
-        <p:grpSp>
-          <p:nvGrpSpPr>
-            <p:cNvPr id="10" name="Group 9"/>
-            <p:cNvGrpSpPr/>
-            <p:nvPr/>
-          </p:nvGrpSpPr>
-          <p:grpSpPr>
-            <a:xfrm>
-              <a:off x="4561895" y="1010559"/>
-              <a:ext cx="3211339" cy="4709984"/>
-              <a:chOff x="4561895" y="1010559"/>
-              <a:chExt cx="3211339" cy="4709984"/>
-            </a:xfrm>
-          </p:grpSpPr>
-          <p:sp>
-            <p:nvSpPr>
-              <p:cNvPr id="9" name="Rectangle 8"/>
-              <p:cNvSpPr/>
-              <p:nvPr/>
-            </p:nvSpPr>
-            <p:spPr>
-              <a:xfrm>
-                <a:off x="4561895" y="1033807"/>
-                <a:ext cx="3211339" cy="4686735"/>
-              </a:xfrm>
-              <a:prstGeom prst="rect">
-                <a:avLst/>
-              </a:prstGeom>
-              <a:solidFill>
-                <a:schemeClr val="bg1"/>
-              </a:solidFill>
-              <a:ln>
-                <a:noFill/>
-              </a:ln>
-            </p:spPr>
-            <p:style>
-              <a:lnRef idx="2">
-                <a:schemeClr val="accent1">
-                  <a:shade val="50000"/>
-                </a:schemeClr>
-              </a:lnRef>
-              <a:fillRef idx="1">
-                <a:schemeClr val="accent1"/>
-              </a:fillRef>
-              <a:effectRef idx="0">
-                <a:schemeClr val="accent1"/>
-              </a:effectRef>
-              <a:fontRef idx="minor">
-                <a:schemeClr val="lt1"/>
-              </a:fontRef>
-            </p:style>
-            <p:txBody>
-              <a:bodyPr rtlCol="0" anchor="ctr"/>
-              <a:lstStyle/>
-              <a:p>
-                <a:pPr algn="ctr"/>
-                <a:endParaRPr lang="en-US"/>
-              </a:p>
-            </p:txBody>
-          </p:sp>
-          <p:grpSp>
-            <p:nvGrpSpPr>
-              <p:cNvPr id="6" name="Group 5"/>
-              <p:cNvGrpSpPr/>
-              <p:nvPr/>
-            </p:nvGrpSpPr>
-            <p:grpSpPr>
-              <a:xfrm>
-                <a:off x="4561897" y="1010559"/>
-                <a:ext cx="3211337" cy="4709984"/>
-                <a:chOff x="4530900" y="1630490"/>
-                <a:chExt cx="3211337" cy="4709984"/>
-              </a:xfrm>
-              <a:solidFill>
-                <a:schemeClr val="bg1"/>
-              </a:solidFill>
-            </p:grpSpPr>
-            <p:pic>
-              <p:nvPicPr>
-                <p:cNvPr id="4" name="hackyhour2_gentlebensv2">
-                  <a:hlinkClick r:id="" action="ppaction://media"/>
-                </p:cNvPr>
-                <p:cNvPicPr>
-                  <a:picLocks noChangeAspect="1"/>
-                </p:cNvPicPr>
-                <p:nvPr>
-                  <a:videoFile r:link="rId2"/>
-                  <p:extLst>
-                    <p:ext uri="{DAA4B4D4-6D71-4841-9C94-3DE7FCFB9230}">
-                      <p14:media xmlns:p14="http://schemas.microsoft.com/office/powerpoint/2010/main" r:embed="rId1"/>
-                    </p:ext>
-                  </p:extLst>
-                </p:nvPr>
-              </p:nvPicPr>
-              <p:blipFill>
-                <a:blip r:embed="rId4"/>
-                <a:stretch>
-                  <a:fillRect/>
-                </a:stretch>
-              </p:blipFill>
-              <p:spPr>
-                <a:xfrm>
-                  <a:off x="4530900" y="2184400"/>
-                  <a:ext cx="3211337" cy="4156074"/>
-                </a:xfrm>
-                <a:prstGeom prst="rect">
-                  <a:avLst/>
-                </a:prstGeom>
-                <a:grpFill/>
-              </p:spPr>
-            </p:pic>
-            <p:pic>
-              <p:nvPicPr>
-                <p:cNvPr id="5" name="Picture 4"/>
-                <p:cNvPicPr>
-                  <a:picLocks noChangeAspect="1"/>
-                </p:cNvPicPr>
-                <p:nvPr/>
-              </p:nvPicPr>
-              <p:blipFill rotWithShape="1">
-                <a:blip r:embed="rId5">
-                  <a:biLevel thresh="75000"/>
-                  <a:extLst>
-                    <a:ext uri="{28A0092B-C50C-407E-A947-70E740481C1C}">
-                      <a14:useLocalDpi xmlns:a14="http://schemas.microsoft.com/office/drawing/2010/main" val="0"/>
-                    </a:ext>
-                  </a:extLst>
-                </a:blip>
-                <a:srcRect l="29666"/>
-                <a:stretch/>
-              </p:blipFill>
-              <p:spPr>
-                <a:xfrm>
-                  <a:off x="4579749" y="1630490"/>
-                  <a:ext cx="1482111" cy="530661"/>
-                </a:xfrm>
-                <a:prstGeom prst="rect">
-                  <a:avLst/>
-                </a:prstGeom>
-                <a:grpFill/>
-              </p:spPr>
-            </p:pic>
-          </p:grpSp>
-        </p:grpSp>
-        <p:cxnSp>
-          <p:nvCxnSpPr>
-            <p:cNvPr id="8" name="Straight Connector 7"/>
-            <p:cNvCxnSpPr/>
-            <p:nvPr/>
-          </p:nvCxnSpPr>
-          <p:spPr>
-            <a:xfrm>
-              <a:off x="4610746" y="1564469"/>
-              <a:ext cx="3162488" cy="0"/>
-            </a:xfrm>
-            <a:prstGeom prst="line">
-              <a:avLst/>
-            </a:prstGeom>
-            <a:ln w="12700">
-              <a:solidFill>
-                <a:schemeClr val="tx1"/>
-              </a:solidFill>
-            </a:ln>
-          </p:spPr>
-          <p:style>
-            <a:lnRef idx="1">
-              <a:schemeClr val="accent1"/>
-            </a:lnRef>
-            <a:fillRef idx="0">
-              <a:schemeClr val="accent1"/>
-            </a:fillRef>
-            <a:effectRef idx="0">
-              <a:schemeClr val="accent1"/>
-            </a:effectRef>
-            <a:fontRef idx="minor">
-              <a:schemeClr val="tx1"/>
-            </a:fontRef>
-          </p:style>
-        </p:cxnSp>
-      </p:grpSp>
-      <p:sp>
-        <p:nvSpPr>
-          <p:cNvPr id="16" name="TextBox 15"/>
-          <p:cNvSpPr txBox="1"/>
-          <p:nvPr/>
-        </p:nvSpPr>
-        <p:spPr>
-          <a:xfrm>
-            <a:off x="7867413" y="1249920"/>
-            <a:ext cx="766557" cy="369332"/>
-          </a:xfrm>
-          <a:prstGeom prst="rect">
-            <a:avLst/>
-          </a:prstGeom>
-          <a:noFill/>
-        </p:spPr>
-        <p:txBody>
-          <a:bodyPr wrap="none" rtlCol="0">
-            <a:spAutoFit/>
-          </a:bodyPr>
-          <a:lstStyle/>
-          <a:p>
-            <a:r>
-              <a:rPr lang="en-US" smtClean="0">
-                <a:latin typeface="Brush Script MT" charset="0"/>
-                <a:ea typeface="Brush Script MT" charset="0"/>
-                <a:cs typeface="Brush Script MT" charset="0"/>
-              </a:rPr>
-              <a:t>presents</a:t>
-            </a:r>
-            <a:endParaRPr lang="en-US">
-              <a:latin typeface="Brush Script MT" charset="0"/>
-              <a:ea typeface="Brush Script MT" charset="0"/>
-              <a:cs typeface="Brush Script MT" charset="0"/>
-            </a:endParaRPr>
-          </a:p>
-        </p:txBody>
-      </p:sp>
-      <p:grpSp>
-        <p:nvGrpSpPr>
           <p:cNvPr id="23" name="Group 22"/>
           <p:cNvGrpSpPr/>
           <p:nvPr/>
@@ -4775,7 +4639,7 @@
             <p:nvPr/>
           </p:nvPicPr>
           <p:blipFill>
-            <a:blip r:embed="rId6">
+            <a:blip r:embed="rId2">
               <a:extLst>
                 <a:ext uri="{28A0092B-C50C-407E-A947-70E740481C1C}">
                   <a14:useLocalDpi xmlns:a14="http://schemas.microsoft.com/office/drawing/2010/main" val="0"/>
@@ -4825,21 +4689,8 @@
                   <a:ea typeface="Helvetica" charset="0"/>
                   <a:cs typeface="Helvetica" charset="0"/>
                 </a:rPr>
-                <a:t>Thursdays 4-7 PM @ Gentle Ben’s </a:t>
+                <a:t>Thursdays 4-7 PM @ Gentle Ben’s Brewing</a:t>
               </a:r>
-              <a:r>
-                <a:rPr lang="en-US" sz="1050" b="1" dirty="0" smtClean="0">
-                  <a:latin typeface="Helvetica" charset="0"/>
-                  <a:ea typeface="Helvetica" charset="0"/>
-                  <a:cs typeface="Helvetica" charset="0"/>
-                </a:rPr>
-                <a:t>Brewing</a:t>
-              </a:r>
-              <a:endParaRPr lang="en-US" sz="1050" b="1" dirty="0" smtClean="0">
-                <a:latin typeface="Helvetica" charset="0"/>
-                <a:ea typeface="Helvetica" charset="0"/>
-                <a:cs typeface="Helvetica" charset="0"/>
-              </a:endParaRPr>
             </a:p>
             <a:p>
               <a:pPr algn="ctr"/>
@@ -4904,6 +4755,379 @@
           </p:txBody>
         </p:sp>
       </p:grpSp>
+      <p:grpSp>
+        <p:nvGrpSpPr>
+          <p:cNvPr id="29" name="Group 28"/>
+          <p:cNvGrpSpPr/>
+          <p:nvPr/>
+        </p:nvGrpSpPr>
+        <p:grpSpPr>
+          <a:xfrm>
+            <a:off x="5687028" y="1129681"/>
+            <a:ext cx="3537444" cy="5137287"/>
+            <a:chOff x="5687028" y="1129681"/>
+            <a:chExt cx="3537444" cy="5137287"/>
+          </a:xfrm>
+        </p:grpSpPr>
+        <p:sp>
+          <p:nvSpPr>
+            <p:cNvPr id="28" name="Rectangle 27"/>
+            <p:cNvSpPr/>
+            <p:nvPr/>
+          </p:nvSpPr>
+          <p:spPr>
+            <a:xfrm>
+              <a:off x="5687028" y="1129681"/>
+              <a:ext cx="3537444" cy="5137287"/>
+            </a:xfrm>
+            <a:prstGeom prst="rect">
+              <a:avLst/>
+            </a:prstGeom>
+            <a:solidFill>
+              <a:schemeClr val="bg1"/>
+            </a:solidFill>
+            <a:ln>
+              <a:noFill/>
+            </a:ln>
+            <a:effectLst/>
+          </p:spPr>
+          <p:style>
+            <a:lnRef idx="2">
+              <a:schemeClr val="accent1">
+                <a:shade val="50000"/>
+              </a:schemeClr>
+            </a:lnRef>
+            <a:fillRef idx="1">
+              <a:schemeClr val="accent1"/>
+            </a:fillRef>
+            <a:effectRef idx="0">
+              <a:schemeClr val="accent1"/>
+            </a:effectRef>
+            <a:fontRef idx="minor">
+              <a:schemeClr val="lt1"/>
+            </a:fontRef>
+          </p:style>
+          <p:txBody>
+            <a:bodyPr rtlCol="0" anchor="ctr"/>
+            <a:lstStyle/>
+            <a:p>
+              <a:pPr algn="ctr"/>
+              <a:endParaRPr lang="en-US"/>
+            </a:p>
+          </p:txBody>
+        </p:sp>
+        <p:grpSp>
+          <p:nvGrpSpPr>
+            <p:cNvPr id="27" name="Group 26"/>
+            <p:cNvGrpSpPr/>
+            <p:nvPr/>
+          </p:nvGrpSpPr>
+          <p:grpSpPr>
+            <a:xfrm>
+              <a:off x="5687028" y="1129681"/>
+              <a:ext cx="3537444" cy="5137287"/>
+              <a:chOff x="5687028" y="1129681"/>
+              <a:chExt cx="3537444" cy="5137287"/>
+            </a:xfrm>
+            <a:solidFill>
+              <a:schemeClr val="bg1"/>
+            </a:solidFill>
+          </p:grpSpPr>
+          <p:grpSp>
+            <p:nvGrpSpPr>
+              <p:cNvPr id="13" name="Group 12"/>
+              <p:cNvGrpSpPr/>
+              <p:nvPr/>
+            </p:nvGrpSpPr>
+            <p:grpSpPr>
+              <a:xfrm>
+                <a:off x="5687028" y="1361096"/>
+                <a:ext cx="3537444" cy="4905872"/>
+                <a:chOff x="5687028" y="1361096"/>
+                <a:chExt cx="3537444" cy="4905872"/>
+              </a:xfrm>
+              <a:grpFill/>
+            </p:grpSpPr>
+            <p:sp>
+              <p:nvSpPr>
+                <p:cNvPr id="18" name="TextBox 17"/>
+                <p:cNvSpPr txBox="1"/>
+                <p:nvPr/>
+              </p:nvSpPr>
+              <p:spPr>
+                <a:xfrm>
+                  <a:off x="7208750" y="1361096"/>
+                  <a:ext cx="766557" cy="369332"/>
+                </a:xfrm>
+                <a:prstGeom prst="rect">
+                  <a:avLst/>
+                </a:prstGeom>
+                <a:grpFill/>
+              </p:spPr>
+              <p:txBody>
+                <a:bodyPr wrap="none" rtlCol="0">
+                  <a:spAutoFit/>
+                </a:bodyPr>
+                <a:lstStyle/>
+                <a:p>
+                  <a:r>
+                    <a:rPr lang="en-US" dirty="0" smtClean="0">
+                      <a:latin typeface="Brush Script MT" charset="0"/>
+                      <a:ea typeface="Brush Script MT" charset="0"/>
+                      <a:cs typeface="Brush Script MT" charset="0"/>
+                    </a:rPr>
+                    <a:t>presents</a:t>
+                  </a:r>
+                  <a:endParaRPr lang="en-US" dirty="0">
+                    <a:latin typeface="Brush Script MT" charset="0"/>
+                    <a:ea typeface="Brush Script MT" charset="0"/>
+                    <a:cs typeface="Brush Script MT" charset="0"/>
+                  </a:endParaRPr>
+                </a:p>
+              </p:txBody>
+            </p:sp>
+            <p:cxnSp>
+              <p:nvCxnSpPr>
+                <p:cNvPr id="19" name="Straight Connector 18"/>
+                <p:cNvCxnSpPr/>
+                <p:nvPr/>
+              </p:nvCxnSpPr>
+              <p:spPr>
+                <a:xfrm>
+                  <a:off x="5809862" y="1676400"/>
+                  <a:ext cx="3321438" cy="0"/>
+                </a:xfrm>
+                <a:prstGeom prst="line">
+                  <a:avLst/>
+                </a:prstGeom>
+                <a:grpFill/>
+                <a:ln w="12700">
+                  <a:solidFill>
+                    <a:schemeClr val="tx1"/>
+                  </a:solidFill>
+                </a:ln>
+              </p:spPr>
+              <p:style>
+                <a:lnRef idx="1">
+                  <a:schemeClr val="accent1"/>
+                </a:lnRef>
+                <a:fillRef idx="0">
+                  <a:schemeClr val="accent1"/>
+                </a:fillRef>
+                <a:effectRef idx="0">
+                  <a:schemeClr val="accent1"/>
+                </a:effectRef>
+                <a:fontRef idx="minor">
+                  <a:schemeClr val="tx1"/>
+                </a:fontRef>
+              </p:style>
+            </p:cxnSp>
+            <p:pic>
+              <p:nvPicPr>
+                <p:cNvPr id="3" name="Picture 2"/>
+                <p:cNvPicPr>
+                  <a:picLocks noChangeAspect="1"/>
+                </p:cNvPicPr>
+                <p:nvPr/>
+              </p:nvPicPr>
+              <p:blipFill>
+                <a:blip r:embed="rId3">
+                  <a:extLst>
+                    <a:ext uri="{28A0092B-C50C-407E-A947-70E740481C1C}">
+                      <a14:useLocalDpi xmlns:a14="http://schemas.microsoft.com/office/drawing/2010/main" val="0"/>
+                    </a:ext>
+                  </a:extLst>
+                </a:blip>
+                <a:stretch>
+                  <a:fillRect/>
+                </a:stretch>
+              </p:blipFill>
+              <p:spPr>
+                <a:xfrm>
+                  <a:off x="5687028" y="1689100"/>
+                  <a:ext cx="3537444" cy="4577868"/>
+                </a:xfrm>
+                <a:prstGeom prst="rect">
+                  <a:avLst/>
+                </a:prstGeom>
+                <a:grpFill/>
+              </p:spPr>
+            </p:pic>
+            <p:sp>
+              <p:nvSpPr>
+                <p:cNvPr id="24" name="TextBox 23"/>
+                <p:cNvSpPr txBox="1"/>
+                <p:nvPr/>
+              </p:nvSpPr>
+              <p:spPr>
+                <a:xfrm>
+                  <a:off x="5882180" y="5512951"/>
+                  <a:ext cx="3153670" cy="430887"/>
+                </a:xfrm>
+                <a:prstGeom prst="rect">
+                  <a:avLst/>
+                </a:prstGeom>
+                <a:noFill/>
+              </p:spPr>
+              <p:txBody>
+                <a:bodyPr wrap="square" rtlCol="0">
+                  <a:spAutoFit/>
+                </a:bodyPr>
+                <a:lstStyle/>
+                <a:p>
+                  <a:pPr algn="ctr"/>
+                  <a:r>
+                    <a:rPr lang="en-US" sz="1050" b="1" dirty="0" smtClean="0">
+                      <a:latin typeface="Helvetica" charset="0"/>
+                      <a:ea typeface="Helvetica" charset="0"/>
+                      <a:cs typeface="Helvetica" charset="0"/>
+                    </a:rPr>
+                    <a:t>Thursdays </a:t>
+                  </a:r>
+                  <a:r>
+                    <a:rPr lang="en-US" sz="1050" b="1" dirty="0" smtClean="0">
+                      <a:latin typeface="Helvetica" charset="0"/>
+                      <a:ea typeface="Helvetica" charset="0"/>
+                      <a:cs typeface="Helvetica" charset="0"/>
+                    </a:rPr>
+                    <a:t>4-6 </a:t>
+                  </a:r>
+                  <a:r>
+                    <a:rPr lang="en-US" sz="1050" b="1" dirty="0" smtClean="0">
+                      <a:latin typeface="Helvetica" charset="0"/>
+                      <a:ea typeface="Helvetica" charset="0"/>
+                      <a:cs typeface="Helvetica" charset="0"/>
+                    </a:rPr>
+                    <a:t>PM @ Pasco Kitchen &amp; Lounge</a:t>
+                  </a:r>
+                </a:p>
+                <a:p>
+                  <a:pPr algn="ctr"/>
+                  <a:r>
+                    <a:rPr lang="en-US" sz="1050" b="1" dirty="0" smtClean="0">
+                      <a:latin typeface="Helvetica" charset="0"/>
+                      <a:ea typeface="Helvetica" charset="0"/>
+                      <a:cs typeface="Helvetica" charset="0"/>
+                    </a:rPr>
+                    <a:t>Going? Hit us up on       @</a:t>
+                  </a:r>
+                  <a:r>
+                    <a:rPr lang="en-US" sz="1050" b="1" dirty="0" err="1" smtClean="0">
+                      <a:latin typeface="Helvetica" charset="0"/>
+                      <a:ea typeface="Helvetica" charset="0"/>
+                      <a:cs typeface="Helvetica" charset="0"/>
+                    </a:rPr>
+                    <a:t>resbazaz</a:t>
+                  </a:r>
+                  <a:endParaRPr lang="en-US" sz="1050" b="1" dirty="0" smtClean="0">
+                    <a:latin typeface="Helvetica" charset="0"/>
+                    <a:ea typeface="Helvetica" charset="0"/>
+                    <a:cs typeface="Helvetica" charset="0"/>
+                  </a:endParaRPr>
+                </a:p>
+              </p:txBody>
+            </p:sp>
+            <p:sp>
+              <p:nvSpPr>
+                <p:cNvPr id="25" name="Rectangle 24"/>
+                <p:cNvSpPr/>
+                <p:nvPr/>
+              </p:nvSpPr>
+              <p:spPr>
+                <a:xfrm>
+                  <a:off x="5939147" y="5911326"/>
+                  <a:ext cx="3033203" cy="238527"/>
+                </a:xfrm>
+                <a:prstGeom prst="rect">
+                  <a:avLst/>
+                </a:prstGeom>
+                <a:noFill/>
+              </p:spPr>
+              <p:txBody>
+                <a:bodyPr wrap="none">
+                  <a:spAutoFit/>
+                </a:bodyPr>
+                <a:lstStyle/>
+                <a:p>
+                  <a:pPr algn="ctr"/>
+                  <a:r>
+                    <a:rPr lang="en-US" sz="950" b="1" dirty="0">
+                      <a:latin typeface="Helvetica" charset="0"/>
+                      <a:ea typeface="Helvetica" charset="0"/>
+                      <a:cs typeface="Helvetica" charset="0"/>
+                    </a:rPr>
+                    <a:t>Coding! Science! Zymurgy! Or start the weekend!</a:t>
+                  </a:r>
+                </a:p>
+              </p:txBody>
+            </p:sp>
+            <p:pic>
+              <p:nvPicPr>
+                <p:cNvPr id="14" name="Picture 2" descr="mage result for twitter icon"/>
+                <p:cNvPicPr>
+                  <a:picLocks noChangeAspect="1" noChangeArrowheads="1"/>
+                </p:cNvPicPr>
+                <p:nvPr/>
+              </p:nvPicPr>
+              <p:blipFill>
+                <a:blip r:embed="rId4">
+                  <a:extLst>
+                    <a:ext uri="{28A0092B-C50C-407E-A947-70E740481C1C}">
+                      <a14:useLocalDpi xmlns:a14="http://schemas.microsoft.com/office/drawing/2010/main" val="0"/>
+                    </a:ext>
+                  </a:extLst>
+                </a:blip>
+                <a:srcRect/>
+                <a:stretch>
+                  <a:fillRect/>
+                </a:stretch>
+              </p:blipFill>
+              <p:spPr bwMode="auto">
+                <a:xfrm>
+                  <a:off x="7672722" y="5716881"/>
+                  <a:ext cx="181745" cy="181745"/>
+                </a:xfrm>
+                <a:prstGeom prst="rect">
+                  <a:avLst/>
+                </a:prstGeom>
+                <a:grpFill/>
+                <a:extLst/>
+              </p:spPr>
+            </p:pic>
+          </p:grpSp>
+          <p:pic>
+            <p:nvPicPr>
+              <p:cNvPr id="26" name="Picture 25"/>
+              <p:cNvPicPr>
+                <a:picLocks noChangeAspect="1"/>
+              </p:cNvPicPr>
+              <p:nvPr/>
+            </p:nvPicPr>
+            <p:blipFill rotWithShape="1">
+              <a:blip r:embed="rId5">
+                <a:biLevel thresh="75000"/>
+                <a:extLst>
+                  <a:ext uri="{28A0092B-C50C-407E-A947-70E740481C1C}">
+                    <a14:useLocalDpi xmlns:a14="http://schemas.microsoft.com/office/drawing/2010/main" val="0"/>
+                  </a:ext>
+                </a:extLst>
+              </a:blip>
+              <a:srcRect l="31426"/>
+              <a:stretch/>
+            </p:blipFill>
+            <p:spPr>
+              <a:xfrm>
+                <a:off x="5818680" y="1129681"/>
+                <a:ext cx="1444752" cy="530564"/>
+              </a:xfrm>
+              <a:prstGeom prst="rect">
+                <a:avLst/>
+              </a:prstGeom>
+              <a:grpFill/>
+            </p:spPr>
+          </p:pic>
+        </p:grpSp>
+      </p:grpSp>
     </p:spTree>
     <p:extLst>
       <p:ext uri="{BB962C8B-B14F-4D97-AF65-F5344CB8AC3E}">
@@ -4919,18 +5143,9 @@
       <p:par>
         <p:cTn id="1" dur="indefinite" restart="never" nodeType="tmRoot">
           <p:childTnLst>
-            <p:video>
-              <p:cMediaNode vol="80000">
-                <p:cTn id="2" fill="hold" display="0">
-                  <p:stCondLst>
-                    <p:cond delay="indefinite"/>
-                  </p:stCondLst>
-                </p:cTn>
-                <p:tgtEl>
-                  <p:spTgt spid="4"/>
-                </p:tgtEl>
-              </p:cMediaNode>
-            </p:video>
+            <p:par>
+              <p:cTn id="2"/>
+            </p:par>
           </p:childTnLst>
         </p:cTn>
       </p:par>
@@ -4958,7 +5173,7 @@
       </p:grpSpPr>
       <p:grpSp>
         <p:nvGrpSpPr>
-          <p:cNvPr id="7" name="Group 6"/>
+          <p:cNvPr id="2" name="Group 1"/>
           <p:cNvGrpSpPr/>
           <p:nvPr/>
         </p:nvGrpSpPr>
@@ -4970,124 +5185,180 @@
             <a:chExt cx="5299364" cy="6858000"/>
           </a:xfrm>
         </p:grpSpPr>
+        <p:grpSp>
+          <p:nvGrpSpPr>
+            <p:cNvPr id="7" name="Group 6"/>
+            <p:cNvGrpSpPr/>
+            <p:nvPr/>
+          </p:nvGrpSpPr>
+          <p:grpSpPr>
+            <a:xfrm>
+              <a:off x="3441700" y="0"/>
+              <a:ext cx="5299364" cy="6858000"/>
+              <a:chOff x="3441700" y="0"/>
+              <a:chExt cx="5299364" cy="6858000"/>
+            </a:xfrm>
+          </p:grpSpPr>
+          <p:pic>
+            <p:nvPicPr>
+              <p:cNvPr id="5" name="Picture 4"/>
+              <p:cNvPicPr>
+                <a:picLocks noChangeAspect="1"/>
+              </p:cNvPicPr>
+              <p:nvPr/>
+            </p:nvPicPr>
+            <p:blipFill>
+              <a:blip r:embed="rId2">
+                <a:extLst>
+                  <a:ext uri="{28A0092B-C50C-407E-A947-70E740481C1C}">
+                    <a14:useLocalDpi xmlns:a14="http://schemas.microsoft.com/office/drawing/2010/main" val="0"/>
+                  </a:ext>
+                </a:extLst>
+              </a:blip>
+              <a:stretch>
+                <a:fillRect/>
+              </a:stretch>
+            </p:blipFill>
+            <p:spPr>
+              <a:xfrm>
+                <a:off x="3441700" y="0"/>
+                <a:ext cx="5299364" cy="6858000"/>
+              </a:xfrm>
+              <a:prstGeom prst="rect">
+                <a:avLst/>
+              </a:prstGeom>
+            </p:spPr>
+          </p:pic>
+          <p:sp>
+            <p:nvSpPr>
+              <p:cNvPr id="6" name="TextBox 5"/>
+              <p:cNvSpPr txBox="1"/>
+              <p:nvPr/>
+            </p:nvSpPr>
+            <p:spPr>
+              <a:xfrm>
+                <a:off x="3591454" y="5567137"/>
+                <a:ext cx="4896563" cy="1107996"/>
+              </a:xfrm>
+              <a:prstGeom prst="rect">
+                <a:avLst/>
+              </a:prstGeom>
+              <a:noFill/>
+            </p:spPr>
+            <p:txBody>
+              <a:bodyPr wrap="square" rtlCol="0">
+                <a:spAutoFit/>
+              </a:bodyPr>
+              <a:lstStyle/>
+              <a:p>
+                <a:pPr algn="ctr">
+                  <a:lnSpc>
+                    <a:spcPct val="150000"/>
+                  </a:lnSpc>
+                </a:pPr>
+                <a:r>
+                  <a:rPr lang="en-US" sz="1400" b="1" dirty="0" smtClean="0">
+                    <a:latin typeface="Helvetica" charset="0"/>
+                    <a:ea typeface="Helvetica" charset="0"/>
+                    <a:cs typeface="Helvetica" charset="0"/>
+                  </a:rPr>
+                  <a:t>Weekly, Tuesdays 8-10 AM @ The Nucleus Cafe </a:t>
+                </a:r>
+              </a:p>
+              <a:p>
+                <a:pPr algn="ctr">
+                  <a:lnSpc>
+                    <a:spcPct val="150000"/>
+                  </a:lnSpc>
+                </a:pPr>
+                <a:r>
+                  <a:rPr lang="en-US" sz="1400" b="1" dirty="0" smtClean="0">
+                    <a:latin typeface="Helvetica" charset="0"/>
+                    <a:ea typeface="Helvetica" charset="0"/>
+                    <a:cs typeface="Helvetica" charset="0"/>
+                  </a:rPr>
+                  <a:t>Going? Hit us up on         @</a:t>
+                </a:r>
+                <a:r>
+                  <a:rPr lang="en-US" sz="1400" b="1" dirty="0" err="1" smtClean="0">
+                    <a:latin typeface="Helvetica" charset="0"/>
+                    <a:ea typeface="Helvetica" charset="0"/>
+                    <a:cs typeface="Helvetica" charset="0"/>
+                  </a:rPr>
+                  <a:t>resbazaz</a:t>
+                </a:r>
+                <a:endParaRPr lang="en-US" sz="1400" b="1" dirty="0">
+                  <a:latin typeface="Helvetica" charset="0"/>
+                  <a:ea typeface="Helvetica" charset="0"/>
+                  <a:cs typeface="Helvetica" charset="0"/>
+                </a:endParaRPr>
+              </a:p>
+              <a:p>
+                <a:pPr algn="ctr"/>
+                <a:r>
+                  <a:rPr lang="en-US" sz="1200" b="1" dirty="0" smtClean="0">
+                    <a:latin typeface="Helvetica" charset="0"/>
+                    <a:ea typeface="Helvetica" charset="0"/>
+                    <a:cs typeface="Helvetica" charset="0"/>
+                  </a:rPr>
+                  <a:t>UA BIO5 Institute (Keating building)</a:t>
+                </a:r>
+              </a:p>
+              <a:p>
+                <a:pPr algn="ctr"/>
+                <a:r>
+                  <a:rPr lang="en-US" sz="1200" b="1" dirty="0">
+                    <a:latin typeface="Helvetica" charset="0"/>
+                    <a:ea typeface="Helvetica" charset="0"/>
+                    <a:cs typeface="Helvetica" charset="0"/>
+                  </a:rPr>
+                  <a:t>1657 E Helen St, Tucson, AZ 85721</a:t>
+                </a:r>
+              </a:p>
+            </p:txBody>
+          </p:sp>
+        </p:grpSp>
         <p:pic>
           <p:nvPicPr>
-            <p:cNvPr id="5" name="Picture 4"/>
+            <p:cNvPr id="2050" name="Picture 2" descr="mage result for twitter icon"/>
             <p:cNvPicPr>
-              <a:picLocks noChangeAspect="1"/>
+              <a:picLocks noChangeAspect="1" noChangeArrowheads="1"/>
             </p:cNvPicPr>
             <p:nvPr/>
           </p:nvPicPr>
           <p:blipFill>
-            <a:blip r:embed="rId2">
+            <a:blip r:embed="rId3">
               <a:extLst>
                 <a:ext uri="{28A0092B-C50C-407E-A947-70E740481C1C}">
                   <a14:useLocalDpi xmlns:a14="http://schemas.microsoft.com/office/drawing/2010/main" val="0"/>
                 </a:ext>
               </a:extLst>
             </a:blip>
+            <a:srcRect/>
             <a:stretch>
               <a:fillRect/>
             </a:stretch>
           </p:blipFill>
-          <p:spPr>
+          <p:spPr bwMode="auto">
             <a:xfrm>
-              <a:off x="3441700" y="0"/>
-              <a:ext cx="5299364" cy="6858000"/>
-            </a:xfrm>
-            <a:prstGeom prst="rect">
-              <a:avLst/>
-            </a:prstGeom>
-          </p:spPr>
-        </p:pic>
-        <p:sp>
-          <p:nvSpPr>
-            <p:cNvPr id="6" name="TextBox 5"/>
-            <p:cNvSpPr txBox="1"/>
-            <p:nvPr/>
-          </p:nvSpPr>
-          <p:spPr>
-            <a:xfrm>
-              <a:off x="3591454" y="5567137"/>
-              <a:ext cx="4896563" cy="1107996"/>
+              <a:off x="6289695" y="5930900"/>
+              <a:ext cx="329935" cy="329935"/>
             </a:xfrm>
             <a:prstGeom prst="rect">
               <a:avLst/>
             </a:prstGeom>
             <a:noFill/>
+            <a:extLst>
+              <a:ext uri="{909E8E84-426E-40DD-AFC4-6F175D3DCCD1}">
+                <a14:hiddenFill xmlns:a14="http://schemas.microsoft.com/office/drawing/2010/main">
+                  <a:solidFill>
+                    <a:srgbClr val="FFFFFF"/>
+                  </a:solidFill>
+                </a14:hiddenFill>
+              </a:ext>
+            </a:extLst>
           </p:spPr>
-          <p:txBody>
-            <a:bodyPr wrap="square" rtlCol="0">
-              <a:spAutoFit/>
-            </a:bodyPr>
-            <a:lstStyle/>
-            <a:p>
-              <a:pPr algn="ctr"/>
-              <a:r>
-                <a:rPr lang="en-US" sz="1400" b="1" dirty="0" smtClean="0">
-                  <a:latin typeface="Helvetica" charset="0"/>
-                  <a:ea typeface="Helvetica" charset="0"/>
-                  <a:cs typeface="Helvetica" charset="0"/>
-                </a:rPr>
-                <a:t>Weekly, Tuesdays 8-10 AM @ The Nucleus Cafe </a:t>
-              </a:r>
-            </a:p>
-            <a:p>
-              <a:pPr algn="ctr"/>
-              <a:r>
-                <a:rPr lang="en-US" sz="1400" b="1" dirty="0" smtClean="0">
-                  <a:latin typeface="Helvetica" charset="0"/>
-                  <a:ea typeface="Helvetica" charset="0"/>
-                  <a:cs typeface="Helvetica" charset="0"/>
-                </a:rPr>
-                <a:t>Going? Hit us up @</a:t>
-              </a:r>
-              <a:r>
-                <a:rPr lang="en-US" sz="1400" b="1" dirty="0" err="1" smtClean="0">
-                  <a:latin typeface="Helvetica" charset="0"/>
-                  <a:ea typeface="Helvetica" charset="0"/>
-                  <a:cs typeface="Helvetica" charset="0"/>
-                </a:rPr>
-                <a:t>resbazaz</a:t>
-              </a:r>
-              <a:endParaRPr lang="en-US" sz="1400" b="1" dirty="0">
-                <a:latin typeface="Helvetica" charset="0"/>
-                <a:ea typeface="Helvetica" charset="0"/>
-                <a:cs typeface="Helvetica" charset="0"/>
-              </a:endParaRPr>
-            </a:p>
-            <a:p>
-              <a:pPr algn="ctr"/>
-              <a:endParaRPr lang="en-US" sz="1400" b="1" dirty="0">
-                <a:latin typeface="Helvetica" charset="0"/>
-                <a:ea typeface="Helvetica" charset="0"/>
-                <a:cs typeface="Helvetica" charset="0"/>
-              </a:endParaRPr>
-            </a:p>
-            <a:p>
-              <a:pPr algn="ctr"/>
-              <a:r>
-                <a:rPr lang="en-US" sz="1200" b="1" dirty="0" smtClean="0">
-                  <a:latin typeface="Helvetica" charset="0"/>
-                  <a:ea typeface="Helvetica" charset="0"/>
-                  <a:cs typeface="Helvetica" charset="0"/>
-                </a:rPr>
-                <a:t>UA BIO5 Institute (Keating building)</a:t>
-              </a:r>
-            </a:p>
-            <a:p>
-              <a:pPr algn="ctr"/>
-              <a:r>
-                <a:rPr lang="en-US" sz="1200" b="1" dirty="0">
-                  <a:latin typeface="Helvetica" charset="0"/>
-                  <a:ea typeface="Helvetica" charset="0"/>
-                  <a:cs typeface="Helvetica" charset="0"/>
-                </a:rPr>
-                <a:t>1657 E Helen St, Tucson, AZ 85721</a:t>
-              </a:r>
-            </a:p>
-          </p:txBody>
-        </p:sp>
+        </p:pic>
       </p:grpSp>
     </p:spTree>
     <p:extLst>

</xml_diff>

<commit_message>
Updated Pasco All Day Happy Hour Thirsty Thursday. To quote Julian: Ermahgerd
</commit_message>
<xml_diff>
--- a/material_design/ResBazAZ_advertising.pptx
+++ b/material_design/ResBazAZ_advertising.pptx
@@ -4689,8 +4689,21 @@
                   <a:ea typeface="Helvetica" charset="0"/>
                   <a:cs typeface="Helvetica" charset="0"/>
                 </a:rPr>
-                <a:t>Thursdays 4-7 PM @ Gentle Ben’s Brewing</a:t>
+                <a:t>Thursdays 4-7 PM @ </a:t>
               </a:r>
+              <a:r>
+                <a:rPr lang="en-US" sz="1050" b="1" dirty="0" smtClean="0">
+                  <a:latin typeface="Helvetica" charset="0"/>
+                  <a:ea typeface="Helvetica" charset="0"/>
+                  <a:cs typeface="Helvetica" charset="0"/>
+                </a:rPr>
+                <a:t>Pasco Kitchen &amp; Lounge</a:t>
+              </a:r>
+              <a:endParaRPr lang="en-US" sz="1050" b="1" dirty="0" smtClean="0">
+                <a:latin typeface="Helvetica" charset="0"/>
+                <a:ea typeface="Helvetica" charset="0"/>
+                <a:cs typeface="Helvetica" charset="0"/>
+              </a:endParaRPr>
             </a:p>
             <a:p>
               <a:pPr algn="ctr"/>
@@ -4990,7 +5003,7 @@
                       <a:ea typeface="Helvetica" charset="0"/>
                       <a:cs typeface="Helvetica" charset="0"/>
                     </a:rPr>
-                    <a:t>4-6 </a:t>
+                    <a:t>4-7 </a:t>
                   </a:r>
                   <a:r>
                     <a:rPr lang="en-US" sz="1050" b="1" dirty="0" smtClean="0">

</xml_diff>

<commit_message>
Updated for times and ads for Spring 2017 semester at UA.
</commit_message>
<xml_diff>
--- a/material_design/ResBazAZ_advertising.pptx
+++ b/material_design/ResBazAZ_advertising.pptx
@@ -201,7 +201,7 @@
           <a:p>
             <a:fld id="{89557B8F-298D-0F41-8E5F-760EBE3A772C}" type="datetimeFigureOut">
               <a:rPr lang="en-US" smtClean="0"/>
-              <a:t>1/19/17</a:t>
+              <a:t>1/23/17</a:t>
             </a:fld>
             <a:endParaRPr lang="en-US"/>
           </a:p>
@@ -684,7 +684,7 @@
           <a:p>
             <a:fld id="{7CB893AC-A63D-E544-9034-F1928B542F5E}" type="datetimeFigureOut">
               <a:rPr lang="en-US" smtClean="0"/>
-              <a:t>1/19/17</a:t>
+              <a:t>1/23/17</a:t>
             </a:fld>
             <a:endParaRPr lang="en-US"/>
           </a:p>
@@ -854,7 +854,7 @@
           <a:p>
             <a:fld id="{7CB893AC-A63D-E544-9034-F1928B542F5E}" type="datetimeFigureOut">
               <a:rPr lang="en-US" smtClean="0"/>
-              <a:t>1/19/17</a:t>
+              <a:t>1/23/17</a:t>
             </a:fld>
             <a:endParaRPr lang="en-US"/>
           </a:p>
@@ -1034,7 +1034,7 @@
           <a:p>
             <a:fld id="{7CB893AC-A63D-E544-9034-F1928B542F5E}" type="datetimeFigureOut">
               <a:rPr lang="en-US" smtClean="0"/>
-              <a:t>1/19/17</a:t>
+              <a:t>1/23/17</a:t>
             </a:fld>
             <a:endParaRPr lang="en-US"/>
           </a:p>
@@ -1204,7 +1204,7 @@
           <a:p>
             <a:fld id="{7CB893AC-A63D-E544-9034-F1928B542F5E}" type="datetimeFigureOut">
               <a:rPr lang="en-US" smtClean="0"/>
-              <a:t>1/19/17</a:t>
+              <a:t>1/23/17</a:t>
             </a:fld>
             <a:endParaRPr lang="en-US"/>
           </a:p>
@@ -1450,7 +1450,7 @@
           <a:p>
             <a:fld id="{7CB893AC-A63D-E544-9034-F1928B542F5E}" type="datetimeFigureOut">
               <a:rPr lang="en-US" smtClean="0"/>
-              <a:t>1/19/17</a:t>
+              <a:t>1/23/17</a:t>
             </a:fld>
             <a:endParaRPr lang="en-US"/>
           </a:p>
@@ -1682,7 +1682,7 @@
           <a:p>
             <a:fld id="{7CB893AC-A63D-E544-9034-F1928B542F5E}" type="datetimeFigureOut">
               <a:rPr lang="en-US" smtClean="0"/>
-              <a:t>1/19/17</a:t>
+              <a:t>1/23/17</a:t>
             </a:fld>
             <a:endParaRPr lang="en-US"/>
           </a:p>
@@ -2049,7 +2049,7 @@
           <a:p>
             <a:fld id="{7CB893AC-A63D-E544-9034-F1928B542F5E}" type="datetimeFigureOut">
               <a:rPr lang="en-US" smtClean="0"/>
-              <a:t>1/19/17</a:t>
+              <a:t>1/23/17</a:t>
             </a:fld>
             <a:endParaRPr lang="en-US"/>
           </a:p>
@@ -2167,7 +2167,7 @@
           <a:p>
             <a:fld id="{7CB893AC-A63D-E544-9034-F1928B542F5E}" type="datetimeFigureOut">
               <a:rPr lang="en-US" smtClean="0"/>
-              <a:t>1/19/17</a:t>
+              <a:t>1/23/17</a:t>
             </a:fld>
             <a:endParaRPr lang="en-US"/>
           </a:p>
@@ -2262,7 +2262,7 @@
           <a:p>
             <a:fld id="{7CB893AC-A63D-E544-9034-F1928B542F5E}" type="datetimeFigureOut">
               <a:rPr lang="en-US" smtClean="0"/>
-              <a:t>1/19/17</a:t>
+              <a:t>1/23/17</a:t>
             </a:fld>
             <a:endParaRPr lang="en-US"/>
           </a:p>
@@ -2539,7 +2539,7 @@
           <a:p>
             <a:fld id="{7CB893AC-A63D-E544-9034-F1928B542F5E}" type="datetimeFigureOut">
               <a:rPr lang="en-US" smtClean="0"/>
-              <a:t>1/19/17</a:t>
+              <a:t>1/23/17</a:t>
             </a:fld>
             <a:endParaRPr lang="en-US"/>
           </a:p>
@@ -2792,7 +2792,7 @@
           <a:p>
             <a:fld id="{7CB893AC-A63D-E544-9034-F1928B542F5E}" type="datetimeFigureOut">
               <a:rPr lang="en-US" smtClean="0"/>
-              <a:t>1/19/17</a:t>
+              <a:t>1/23/17</a:t>
             </a:fld>
             <a:endParaRPr lang="en-US"/>
           </a:p>
@@ -3005,7 +3005,7 @@
           <a:p>
             <a:fld id="{7CB893AC-A63D-E544-9034-F1928B542F5E}" type="datetimeFigureOut">
               <a:rPr lang="en-US" smtClean="0"/>
-              <a:t>1/19/17</a:t>
+              <a:t>1/23/17</a:t>
             </a:fld>
             <a:endParaRPr lang="en-US"/>
           </a:p>
@@ -4689,21 +4689,8 @@
                   <a:ea typeface="Helvetica" charset="0"/>
                   <a:cs typeface="Helvetica" charset="0"/>
                 </a:rPr>
-                <a:t>Thursdays 4-7 PM @ </a:t>
+                <a:t>Thursdays 4-7 PM @ Pasco Kitchen &amp; Lounge</a:t>
               </a:r>
-              <a:r>
-                <a:rPr lang="en-US" sz="1050" b="1" dirty="0" smtClean="0">
-                  <a:latin typeface="Helvetica" charset="0"/>
-                  <a:ea typeface="Helvetica" charset="0"/>
-                  <a:cs typeface="Helvetica" charset="0"/>
-                </a:rPr>
-                <a:t>Pasco Kitchen &amp; Lounge</a:t>
-              </a:r>
-              <a:endParaRPr lang="en-US" sz="1050" b="1" dirty="0" smtClean="0">
-                <a:latin typeface="Helvetica" charset="0"/>
-                <a:ea typeface="Helvetica" charset="0"/>
-                <a:cs typeface="Helvetica" charset="0"/>
-              </a:endParaRPr>
             </a:p>
             <a:p>
               <a:pPr algn="ctr"/>
@@ -4995,23 +4982,7 @@
                       <a:ea typeface="Helvetica" charset="0"/>
                       <a:cs typeface="Helvetica" charset="0"/>
                     </a:rPr>
-                    <a:t>Thursdays </a:t>
-                  </a:r>
-                  <a:r>
-                    <a:rPr lang="en-US" sz="1050" b="1" dirty="0" smtClean="0">
-                      <a:latin typeface="Helvetica" charset="0"/>
-                      <a:ea typeface="Helvetica" charset="0"/>
-                      <a:cs typeface="Helvetica" charset="0"/>
-                    </a:rPr>
-                    <a:t>4-7 </a:t>
-                  </a:r>
-                  <a:r>
-                    <a:rPr lang="en-US" sz="1050" b="1" dirty="0" smtClean="0">
-                      <a:latin typeface="Helvetica" charset="0"/>
-                      <a:ea typeface="Helvetica" charset="0"/>
-                      <a:cs typeface="Helvetica" charset="0"/>
-                    </a:rPr>
-                    <a:t>PM @ Pasco Kitchen &amp; Lounge</a:t>
+                    <a:t>Thursdays 4-7 PM @ Pasco Kitchen &amp; Lounge</a:t>
                   </a:r>
                 </a:p>
                 <a:p>
@@ -5186,192 +5157,365 @@
       </p:grpSpPr>
       <p:grpSp>
         <p:nvGrpSpPr>
-          <p:cNvPr id="2" name="Group 1"/>
+          <p:cNvPr id="12" name="Group 11"/>
           <p:cNvGrpSpPr/>
           <p:nvPr/>
         </p:nvGrpSpPr>
         <p:grpSpPr>
           <a:xfrm>
-            <a:off x="3441700" y="0"/>
-            <a:ext cx="5299364" cy="6858000"/>
-            <a:chOff x="3441700" y="0"/>
-            <a:chExt cx="5299364" cy="6858000"/>
+            <a:off x="4140200" y="344299"/>
+            <a:ext cx="4600864" cy="6513701"/>
+            <a:chOff x="4140200" y="344299"/>
+            <a:chExt cx="4600864" cy="6513701"/>
           </a:xfrm>
         </p:grpSpPr>
+        <p:sp>
+          <p:nvSpPr>
+            <p:cNvPr id="8" name="Rectangle 7"/>
+            <p:cNvSpPr/>
+            <p:nvPr/>
+          </p:nvSpPr>
+          <p:spPr>
+            <a:xfrm>
+              <a:off x="4140200" y="344299"/>
+              <a:ext cx="4600863" cy="6513701"/>
+            </a:xfrm>
+            <a:prstGeom prst="rect">
+              <a:avLst/>
+            </a:prstGeom>
+            <a:solidFill>
+              <a:schemeClr val="bg1"/>
+            </a:solidFill>
+            <a:ln>
+              <a:noFill/>
+            </a:ln>
+            <a:effectLst/>
+          </p:spPr>
+          <p:style>
+            <a:lnRef idx="2">
+              <a:schemeClr val="accent1">
+                <a:shade val="50000"/>
+              </a:schemeClr>
+            </a:lnRef>
+            <a:fillRef idx="1">
+              <a:schemeClr val="accent1"/>
+            </a:fillRef>
+            <a:effectRef idx="0">
+              <a:schemeClr val="accent1"/>
+            </a:effectRef>
+            <a:fontRef idx="minor">
+              <a:schemeClr val="lt1"/>
+            </a:fontRef>
+          </p:style>
+          <p:txBody>
+            <a:bodyPr rtlCol="0" anchor="ctr"/>
+            <a:lstStyle/>
+            <a:p>
+              <a:pPr algn="ctr"/>
+              <a:endParaRPr lang="en-US"/>
+            </a:p>
+          </p:txBody>
+        </p:sp>
         <p:grpSp>
           <p:nvGrpSpPr>
-            <p:cNvPr id="7" name="Group 6"/>
+            <p:cNvPr id="2" name="Group 1"/>
             <p:cNvGrpSpPr/>
             <p:nvPr/>
           </p:nvGrpSpPr>
           <p:grpSpPr>
             <a:xfrm>
-              <a:off x="3441700" y="0"/>
-              <a:ext cx="5299364" cy="6858000"/>
+              <a:off x="4140200" y="1028700"/>
+              <a:ext cx="4600864" cy="5829300"/>
               <a:chOff x="3441700" y="0"/>
               <a:chExt cx="5299364" cy="6858000"/>
             </a:xfrm>
           </p:grpSpPr>
+          <p:grpSp>
+            <p:nvGrpSpPr>
+              <p:cNvPr id="7" name="Group 6"/>
+              <p:cNvGrpSpPr/>
+              <p:nvPr/>
+            </p:nvGrpSpPr>
+            <p:grpSpPr>
+              <a:xfrm>
+                <a:off x="3441700" y="0"/>
+                <a:ext cx="5299364" cy="6858000"/>
+                <a:chOff x="3441700" y="0"/>
+                <a:chExt cx="5299364" cy="6858000"/>
+              </a:xfrm>
+            </p:grpSpPr>
+            <p:pic>
+              <p:nvPicPr>
+                <p:cNvPr id="5" name="Picture 4"/>
+                <p:cNvPicPr>
+                  <a:picLocks noChangeAspect="1"/>
+                </p:cNvPicPr>
+                <p:nvPr/>
+              </p:nvPicPr>
+              <p:blipFill>
+                <a:blip r:embed="rId2">
+                  <a:extLst>
+                    <a:ext uri="{28A0092B-C50C-407E-A947-70E740481C1C}">
+                      <a14:useLocalDpi xmlns:a14="http://schemas.microsoft.com/office/drawing/2010/main" val="0"/>
+                    </a:ext>
+                  </a:extLst>
+                </a:blip>
+                <a:stretch>
+                  <a:fillRect/>
+                </a:stretch>
+              </p:blipFill>
+              <p:spPr>
+                <a:xfrm>
+                  <a:off x="3441700" y="0"/>
+                  <a:ext cx="5299364" cy="6858000"/>
+                </a:xfrm>
+                <a:prstGeom prst="rect">
+                  <a:avLst/>
+                </a:prstGeom>
+              </p:spPr>
+            </p:pic>
+            <p:sp>
+              <p:nvSpPr>
+                <p:cNvPr id="6" name="TextBox 5"/>
+                <p:cNvSpPr txBox="1"/>
+                <p:nvPr/>
+              </p:nvSpPr>
+              <p:spPr>
+                <a:xfrm>
+                  <a:off x="3635338" y="5462548"/>
+                  <a:ext cx="4896564" cy="1267315"/>
+                </a:xfrm>
+                <a:prstGeom prst="rect">
+                  <a:avLst/>
+                </a:prstGeom>
+                <a:noFill/>
+              </p:spPr>
+              <p:txBody>
+                <a:bodyPr wrap="square" rtlCol="0">
+                  <a:spAutoFit/>
+                </a:bodyPr>
+                <a:lstStyle/>
+                <a:p>
+                  <a:pPr algn="ctr">
+                    <a:lnSpc>
+                      <a:spcPct val="150000"/>
+                    </a:lnSpc>
+                  </a:pPr>
+                  <a:r>
+                    <a:rPr lang="en-US" sz="1400" b="1" dirty="0" smtClean="0">
+                      <a:latin typeface="Helvetica" charset="0"/>
+                      <a:ea typeface="Helvetica" charset="0"/>
+                      <a:cs typeface="Helvetica" charset="0"/>
+                    </a:rPr>
+                    <a:t>Weekly, Tuesdays 8-10 AM @ The Nucleus Cafe </a:t>
+                  </a:r>
+                </a:p>
+                <a:p>
+                  <a:pPr algn="ctr">
+                    <a:lnSpc>
+                      <a:spcPct val="150000"/>
+                    </a:lnSpc>
+                  </a:pPr>
+                  <a:r>
+                    <a:rPr lang="en-US" sz="1400" b="1" dirty="0" smtClean="0">
+                      <a:latin typeface="Helvetica" charset="0"/>
+                      <a:ea typeface="Helvetica" charset="0"/>
+                      <a:cs typeface="Helvetica" charset="0"/>
+                    </a:rPr>
+                    <a:t>Going? Hit us up on         @</a:t>
+                  </a:r>
+                  <a:r>
+                    <a:rPr lang="en-US" sz="1400" b="1" dirty="0" err="1" smtClean="0">
+                      <a:latin typeface="Helvetica" charset="0"/>
+                      <a:ea typeface="Helvetica" charset="0"/>
+                      <a:cs typeface="Helvetica" charset="0"/>
+                    </a:rPr>
+                    <a:t>resbazaz</a:t>
+                  </a:r>
+                  <a:endParaRPr lang="en-US" sz="1400" b="1" dirty="0">
+                    <a:latin typeface="Helvetica" charset="0"/>
+                    <a:ea typeface="Helvetica" charset="0"/>
+                    <a:cs typeface="Helvetica" charset="0"/>
+                  </a:endParaRPr>
+                </a:p>
+                <a:p>
+                  <a:pPr algn="ctr"/>
+                  <a:r>
+                    <a:rPr lang="en-US" sz="1100" b="1" dirty="0" smtClean="0">
+                      <a:latin typeface="Helvetica" charset="0"/>
+                      <a:ea typeface="Helvetica" charset="0"/>
+                      <a:cs typeface="Helvetica" charset="0"/>
+                    </a:rPr>
+                    <a:t>UA BIO5 Institute (Keating building)</a:t>
+                  </a:r>
+                </a:p>
+                <a:p>
+                  <a:pPr algn="ctr"/>
+                  <a:r>
+                    <a:rPr lang="en-US" sz="1100" b="1" dirty="0">
+                      <a:latin typeface="Helvetica" charset="0"/>
+                      <a:ea typeface="Helvetica" charset="0"/>
+                      <a:cs typeface="Helvetica" charset="0"/>
+                    </a:rPr>
+                    <a:t>1657 E Helen St, Tucson, AZ 85721</a:t>
+                  </a:r>
+                </a:p>
+              </p:txBody>
+            </p:sp>
+          </p:grpSp>
           <p:pic>
             <p:nvPicPr>
-              <p:cNvPr id="5" name="Picture 4"/>
+              <p:cNvPr id="2050" name="Picture 2" descr="mage result for twitter icon"/>
               <p:cNvPicPr>
-                <a:picLocks noChangeAspect="1"/>
+                <a:picLocks noChangeAspect="1" noChangeArrowheads="1"/>
               </p:cNvPicPr>
               <p:nvPr/>
             </p:nvPicPr>
             <p:blipFill>
-              <a:blip r:embed="rId2">
+              <a:blip r:embed="rId3">
                 <a:extLst>
                   <a:ext uri="{28A0092B-C50C-407E-A947-70E740481C1C}">
                     <a14:useLocalDpi xmlns:a14="http://schemas.microsoft.com/office/drawing/2010/main" val="0"/>
                   </a:ext>
                 </a:extLst>
               </a:blip>
+              <a:srcRect/>
               <a:stretch>
                 <a:fillRect/>
               </a:stretch>
             </p:blipFill>
-            <p:spPr>
+            <p:spPr bwMode="auto">
               <a:xfrm>
-                <a:off x="3441700" y="0"/>
-                <a:ext cx="5299364" cy="6858000"/>
-              </a:xfrm>
-              <a:prstGeom prst="rect">
-                <a:avLst/>
-              </a:prstGeom>
-            </p:spPr>
-          </p:pic>
-          <p:sp>
-            <p:nvSpPr>
-              <p:cNvPr id="6" name="TextBox 5"/>
-              <p:cNvSpPr txBox="1"/>
-              <p:nvPr/>
-            </p:nvSpPr>
-            <p:spPr>
-              <a:xfrm>
-                <a:off x="3591454" y="5567137"/>
-                <a:ext cx="4896563" cy="1107996"/>
+                <a:off x="6362836" y="5930900"/>
+                <a:ext cx="329935" cy="329935"/>
               </a:xfrm>
               <a:prstGeom prst="rect">
                 <a:avLst/>
               </a:prstGeom>
               <a:noFill/>
+              <a:extLst>
+                <a:ext uri="{909E8E84-426E-40DD-AFC4-6F175D3DCCD1}">
+                  <a14:hiddenFill xmlns:a14="http://schemas.microsoft.com/office/drawing/2010/main">
+                    <a:solidFill>
+                      <a:srgbClr val="FFFFFF"/>
+                    </a:solidFill>
+                  </a14:hiddenFill>
+                </a:ext>
+              </a:extLst>
             </p:spPr>
-            <p:txBody>
-              <a:bodyPr wrap="square" rtlCol="0">
-                <a:spAutoFit/>
-              </a:bodyPr>
-              <a:lstStyle/>
-              <a:p>
-                <a:pPr algn="ctr">
-                  <a:lnSpc>
-                    <a:spcPct val="150000"/>
-                  </a:lnSpc>
-                </a:pPr>
-                <a:r>
-                  <a:rPr lang="en-US" sz="1400" b="1" dirty="0" smtClean="0">
-                    <a:latin typeface="Helvetica" charset="0"/>
-                    <a:ea typeface="Helvetica" charset="0"/>
-                    <a:cs typeface="Helvetica" charset="0"/>
-                  </a:rPr>
-                  <a:t>Weekly, Tuesdays 8-10 AM @ The Nucleus Cafe </a:t>
-                </a:r>
-              </a:p>
-              <a:p>
-                <a:pPr algn="ctr">
-                  <a:lnSpc>
-                    <a:spcPct val="150000"/>
-                  </a:lnSpc>
-                </a:pPr>
-                <a:r>
-                  <a:rPr lang="en-US" sz="1400" b="1" dirty="0" smtClean="0">
-                    <a:latin typeface="Helvetica" charset="0"/>
-                    <a:ea typeface="Helvetica" charset="0"/>
-                    <a:cs typeface="Helvetica" charset="0"/>
-                  </a:rPr>
-                  <a:t>Going? Hit us up on         @</a:t>
-                </a:r>
-                <a:r>
-                  <a:rPr lang="en-US" sz="1400" b="1" dirty="0" err="1" smtClean="0">
-                    <a:latin typeface="Helvetica" charset="0"/>
-                    <a:ea typeface="Helvetica" charset="0"/>
-                    <a:cs typeface="Helvetica" charset="0"/>
-                  </a:rPr>
-                  <a:t>resbazaz</a:t>
-                </a:r>
-                <a:endParaRPr lang="en-US" sz="1400" b="1" dirty="0">
-                  <a:latin typeface="Helvetica" charset="0"/>
-                  <a:ea typeface="Helvetica" charset="0"/>
-                  <a:cs typeface="Helvetica" charset="0"/>
-                </a:endParaRPr>
-              </a:p>
-              <a:p>
-                <a:pPr algn="ctr"/>
-                <a:r>
-                  <a:rPr lang="en-US" sz="1200" b="1" dirty="0" smtClean="0">
-                    <a:latin typeface="Helvetica" charset="0"/>
-                    <a:ea typeface="Helvetica" charset="0"/>
-                    <a:cs typeface="Helvetica" charset="0"/>
-                  </a:rPr>
-                  <a:t>UA BIO5 Institute (Keating building)</a:t>
-                </a:r>
-              </a:p>
-              <a:p>
-                <a:pPr algn="ctr"/>
-                <a:r>
-                  <a:rPr lang="en-US" sz="1200" b="1" dirty="0">
-                    <a:latin typeface="Helvetica" charset="0"/>
-                    <a:ea typeface="Helvetica" charset="0"/>
-                    <a:cs typeface="Helvetica" charset="0"/>
-                  </a:rPr>
-                  <a:t>1657 E Helen St, Tucson, AZ 85721</a:t>
-                </a:r>
-              </a:p>
-            </p:txBody>
-          </p:sp>
+          </p:pic>
         </p:grpSp>
+        <p:sp>
+          <p:nvSpPr>
+            <p:cNvPr id="9" name="TextBox 8"/>
+            <p:cNvSpPr txBox="1"/>
+            <p:nvPr/>
+          </p:nvSpPr>
+          <p:spPr>
+            <a:xfrm>
+              <a:off x="5938734" y="615495"/>
+              <a:ext cx="960519" cy="461665"/>
+            </a:xfrm>
+            <a:prstGeom prst="rect">
+              <a:avLst/>
+            </a:prstGeom>
+            <a:solidFill>
+              <a:schemeClr val="bg1"/>
+            </a:solidFill>
+          </p:spPr>
+          <p:txBody>
+            <a:bodyPr wrap="none" rtlCol="0">
+              <a:spAutoFit/>
+            </a:bodyPr>
+            <a:lstStyle/>
+            <a:p>
+              <a:r>
+                <a:rPr lang="en-US" sz="2400" dirty="0" smtClean="0">
+                  <a:latin typeface="Brush Script MT" charset="0"/>
+                  <a:ea typeface="Brush Script MT" charset="0"/>
+                  <a:cs typeface="Brush Script MT" charset="0"/>
+                </a:rPr>
+                <a:t>presents</a:t>
+              </a:r>
+              <a:endParaRPr lang="en-US" sz="2400" dirty="0">
+                <a:latin typeface="Brush Script MT" charset="0"/>
+                <a:ea typeface="Brush Script MT" charset="0"/>
+                <a:cs typeface="Brush Script MT" charset="0"/>
+              </a:endParaRPr>
+            </a:p>
+          </p:txBody>
+        </p:sp>
         <p:pic>
           <p:nvPicPr>
-            <p:cNvPr id="2050" name="Picture 2" descr="mage result for twitter icon"/>
+            <p:cNvPr id="10" name="Picture 9"/>
             <p:cNvPicPr>
-              <a:picLocks noChangeAspect="1" noChangeArrowheads="1"/>
+              <a:picLocks noChangeAspect="1"/>
             </p:cNvPicPr>
             <p:nvPr/>
           </p:nvPicPr>
-          <p:blipFill>
-            <a:blip r:embed="rId3">
+          <p:blipFill rotWithShape="1">
+            <a:blip r:embed="rId4">
+              <a:biLevel thresh="75000"/>
               <a:extLst>
                 <a:ext uri="{28A0092B-C50C-407E-A947-70E740481C1C}">
                   <a14:useLocalDpi xmlns:a14="http://schemas.microsoft.com/office/drawing/2010/main" val="0"/>
                 </a:ext>
               </a:extLst>
             </a:blip>
-            <a:srcRect/>
-            <a:stretch>
-              <a:fillRect/>
-            </a:stretch>
+            <a:srcRect l="31426"/>
+            <a:stretch/>
           </p:blipFill>
-          <p:spPr bwMode="auto">
+          <p:spPr>
             <a:xfrm>
-              <a:off x="6289695" y="5930900"/>
-              <a:ext cx="329935" cy="329935"/>
+              <a:off x="4172315" y="344299"/>
+              <a:ext cx="1783986" cy="655143"/>
             </a:xfrm>
             <a:prstGeom prst="rect">
               <a:avLst/>
             </a:prstGeom>
-            <a:noFill/>
-            <a:extLst>
-              <a:ext uri="{909E8E84-426E-40DD-AFC4-6F175D3DCCD1}">
-                <a14:hiddenFill xmlns:a14="http://schemas.microsoft.com/office/drawing/2010/main">
-                  <a:solidFill>
-                    <a:srgbClr val="FFFFFF"/>
-                  </a:solidFill>
-                </a14:hiddenFill>
-              </a:ext>
-            </a:extLst>
+            <a:solidFill>
+              <a:schemeClr val="bg1"/>
+            </a:solidFill>
           </p:spPr>
         </p:pic>
+        <p:cxnSp>
+          <p:nvCxnSpPr>
+            <p:cNvPr id="11" name="Straight Connector 10"/>
+            <p:cNvCxnSpPr/>
+            <p:nvPr/>
+          </p:nvCxnSpPr>
+          <p:spPr>
+            <a:xfrm>
+              <a:off x="4140200" y="1028700"/>
+              <a:ext cx="4600864" cy="0"/>
+            </a:xfrm>
+            <a:prstGeom prst="line">
+              <a:avLst/>
+            </a:prstGeom>
+            <a:solidFill>
+              <a:schemeClr val="bg1"/>
+            </a:solidFill>
+            <a:ln w="12700">
+              <a:solidFill>
+                <a:schemeClr val="tx1"/>
+              </a:solidFill>
+            </a:ln>
+          </p:spPr>
+          <p:style>
+            <a:lnRef idx="1">
+              <a:schemeClr val="accent1"/>
+            </a:lnRef>
+            <a:fillRef idx="0">
+              <a:schemeClr val="accent1"/>
+            </a:fillRef>
+            <a:effectRef idx="0">
+              <a:schemeClr val="accent1"/>
+            </a:effectRef>
+            <a:fontRef idx="minor">
+              <a:schemeClr val="tx1"/>
+            </a:fontRef>
+          </p:style>
+        </p:cxnSp>
       </p:grpSp>
     </p:spTree>
     <p:extLst>

</xml_diff>

<commit_message>
Updated logos for Bazaar 2018
</commit_message>
<xml_diff>
--- a/material_design/ResBazAZ_advertising.pptx
+++ b/material_design/ResBazAZ_advertising.pptx
@@ -201,7 +201,7 @@
           <a:p>
             <a:fld id="{89557B8F-298D-0F41-8E5F-760EBE3A772C}" type="datetimeFigureOut">
               <a:rPr lang="en-US" smtClean="0"/>
-              <a:t>1/23/17</a:t>
+              <a:t>2/21/18</a:t>
             </a:fld>
             <a:endParaRPr lang="en-US"/>
           </a:p>
@@ -265,38 +265,37 @@
           <a:p>
             <a:pPr lvl="0"/>
             <a:r>
-              <a:rPr lang="en-US" smtClean="0"/>
+              <a:rPr lang="en-US"/>
               <a:t>Click to edit Master text styles</a:t>
             </a:r>
           </a:p>
           <a:p>
             <a:pPr lvl="1"/>
             <a:r>
-              <a:rPr lang="en-US" smtClean="0"/>
+              <a:rPr lang="en-US"/>
               <a:t>Second level</a:t>
             </a:r>
           </a:p>
           <a:p>
             <a:pPr lvl="2"/>
             <a:r>
-              <a:rPr lang="en-US" smtClean="0"/>
+              <a:rPr lang="en-US"/>
               <a:t>Third level</a:t>
             </a:r>
           </a:p>
           <a:p>
             <a:pPr lvl="3"/>
             <a:r>
-              <a:rPr lang="en-US" smtClean="0"/>
+              <a:rPr lang="en-US"/>
               <a:t>Fourth level</a:t>
             </a:r>
           </a:p>
           <a:p>
             <a:pPr lvl="4"/>
             <a:r>
-              <a:rPr lang="en-US" smtClean="0"/>
+              <a:rPr lang="en-US"/>
               <a:t>Fifth level</a:t>
             </a:r>
-            <a:endParaRPr lang="en-US"/>
           </a:p>
         </p:txBody>
       </p:sp>
@@ -595,10 +594,9 @@
           </a:lstStyle>
           <a:p>
             <a:r>
-              <a:rPr lang="en-US" smtClean="0"/>
+              <a:rPr lang="en-US"/>
               <a:t>Click to edit Master title style</a:t>
             </a:r>
-            <a:endParaRPr lang="en-US"/>
           </a:p>
         </p:txBody>
       </p:sp>
@@ -660,10 +658,9 @@
           </a:lstStyle>
           <a:p>
             <a:r>
-              <a:rPr lang="en-US" smtClean="0"/>
+              <a:rPr lang="en-US"/>
               <a:t>Click to edit Master subtitle style</a:t>
             </a:r>
-            <a:endParaRPr lang="en-US"/>
           </a:p>
         </p:txBody>
       </p:sp>
@@ -684,7 +681,7 @@
           <a:p>
             <a:fld id="{7CB893AC-A63D-E544-9034-F1928B542F5E}" type="datetimeFigureOut">
               <a:rPr lang="en-US" smtClean="0"/>
-              <a:t>1/23/17</a:t>
+              <a:t>2/21/18</a:t>
             </a:fld>
             <a:endParaRPr lang="en-US"/>
           </a:p>
@@ -778,10 +775,9 @@
           <a:lstStyle/>
           <a:p>
             <a:r>
-              <a:rPr lang="en-US" smtClean="0"/>
+              <a:rPr lang="en-US"/>
               <a:t>Click to edit Master title style</a:t>
             </a:r>
-            <a:endParaRPr lang="en-US"/>
           </a:p>
         </p:txBody>
       </p:sp>
@@ -802,38 +798,37 @@
           <a:p>
             <a:pPr lvl="0"/>
             <a:r>
-              <a:rPr lang="en-US" smtClean="0"/>
+              <a:rPr lang="en-US"/>
               <a:t>Click to edit Master text styles</a:t>
             </a:r>
           </a:p>
           <a:p>
             <a:pPr lvl="1"/>
             <a:r>
-              <a:rPr lang="en-US" smtClean="0"/>
+              <a:rPr lang="en-US"/>
               <a:t>Second level</a:t>
             </a:r>
           </a:p>
           <a:p>
             <a:pPr lvl="2"/>
             <a:r>
-              <a:rPr lang="en-US" smtClean="0"/>
+              <a:rPr lang="en-US"/>
               <a:t>Third level</a:t>
             </a:r>
           </a:p>
           <a:p>
             <a:pPr lvl="3"/>
             <a:r>
-              <a:rPr lang="en-US" smtClean="0"/>
+              <a:rPr lang="en-US"/>
               <a:t>Fourth level</a:t>
             </a:r>
           </a:p>
           <a:p>
             <a:pPr lvl="4"/>
             <a:r>
-              <a:rPr lang="en-US" smtClean="0"/>
+              <a:rPr lang="en-US"/>
               <a:t>Fifth level</a:t>
             </a:r>
-            <a:endParaRPr lang="en-US"/>
           </a:p>
         </p:txBody>
       </p:sp>
@@ -854,7 +849,7 @@
           <a:p>
             <a:fld id="{7CB893AC-A63D-E544-9034-F1928B542F5E}" type="datetimeFigureOut">
               <a:rPr lang="en-US" smtClean="0"/>
-              <a:t>1/23/17</a:t>
+              <a:t>2/21/18</a:t>
             </a:fld>
             <a:endParaRPr lang="en-US"/>
           </a:p>
@@ -953,10 +948,9 @@
           <a:lstStyle/>
           <a:p>
             <a:r>
-              <a:rPr lang="en-US" smtClean="0"/>
+              <a:rPr lang="en-US"/>
               <a:t>Click to edit Master title style</a:t>
             </a:r>
-            <a:endParaRPr lang="en-US"/>
           </a:p>
         </p:txBody>
       </p:sp>
@@ -982,38 +976,37 @@
           <a:p>
             <a:pPr lvl="0"/>
             <a:r>
-              <a:rPr lang="en-US" smtClean="0"/>
+              <a:rPr lang="en-US"/>
               <a:t>Click to edit Master text styles</a:t>
             </a:r>
           </a:p>
           <a:p>
             <a:pPr lvl="1"/>
             <a:r>
-              <a:rPr lang="en-US" smtClean="0"/>
+              <a:rPr lang="en-US"/>
               <a:t>Second level</a:t>
             </a:r>
           </a:p>
           <a:p>
             <a:pPr lvl="2"/>
             <a:r>
-              <a:rPr lang="en-US" smtClean="0"/>
+              <a:rPr lang="en-US"/>
               <a:t>Third level</a:t>
             </a:r>
           </a:p>
           <a:p>
             <a:pPr lvl="3"/>
             <a:r>
-              <a:rPr lang="en-US" smtClean="0"/>
+              <a:rPr lang="en-US"/>
               <a:t>Fourth level</a:t>
             </a:r>
           </a:p>
           <a:p>
             <a:pPr lvl="4"/>
             <a:r>
-              <a:rPr lang="en-US" smtClean="0"/>
+              <a:rPr lang="en-US"/>
               <a:t>Fifth level</a:t>
             </a:r>
-            <a:endParaRPr lang="en-US"/>
           </a:p>
         </p:txBody>
       </p:sp>
@@ -1034,7 +1027,7 @@
           <a:p>
             <a:fld id="{7CB893AC-A63D-E544-9034-F1928B542F5E}" type="datetimeFigureOut">
               <a:rPr lang="en-US" smtClean="0"/>
-              <a:t>1/23/17</a:t>
+              <a:t>2/21/18</a:t>
             </a:fld>
             <a:endParaRPr lang="en-US"/>
           </a:p>
@@ -1128,10 +1121,9 @@
           <a:lstStyle/>
           <a:p>
             <a:r>
-              <a:rPr lang="en-US" smtClean="0"/>
+              <a:rPr lang="en-US"/>
               <a:t>Click to edit Master title style</a:t>
             </a:r>
-            <a:endParaRPr lang="en-US"/>
           </a:p>
         </p:txBody>
       </p:sp>
@@ -1152,38 +1144,37 @@
           <a:p>
             <a:pPr lvl="0"/>
             <a:r>
-              <a:rPr lang="en-US" smtClean="0"/>
+              <a:rPr lang="en-US"/>
               <a:t>Click to edit Master text styles</a:t>
             </a:r>
           </a:p>
           <a:p>
             <a:pPr lvl="1"/>
             <a:r>
-              <a:rPr lang="en-US" smtClean="0"/>
+              <a:rPr lang="en-US"/>
               <a:t>Second level</a:t>
             </a:r>
           </a:p>
           <a:p>
             <a:pPr lvl="2"/>
             <a:r>
-              <a:rPr lang="en-US" smtClean="0"/>
+              <a:rPr lang="en-US"/>
               <a:t>Third level</a:t>
             </a:r>
           </a:p>
           <a:p>
             <a:pPr lvl="3"/>
             <a:r>
-              <a:rPr lang="en-US" smtClean="0"/>
+              <a:rPr lang="en-US"/>
               <a:t>Fourth level</a:t>
             </a:r>
           </a:p>
           <a:p>
             <a:pPr lvl="4"/>
             <a:r>
-              <a:rPr lang="en-US" smtClean="0"/>
+              <a:rPr lang="en-US"/>
               <a:t>Fifth level</a:t>
             </a:r>
-            <a:endParaRPr lang="en-US"/>
           </a:p>
         </p:txBody>
       </p:sp>
@@ -1204,7 +1195,7 @@
           <a:p>
             <a:fld id="{7CB893AC-A63D-E544-9034-F1928B542F5E}" type="datetimeFigureOut">
               <a:rPr lang="en-US" smtClean="0"/>
-              <a:t>1/23/17</a:t>
+              <a:t>2/21/18</a:t>
             </a:fld>
             <a:endParaRPr lang="en-US"/>
           </a:p>
@@ -1307,10 +1298,9 @@
           </a:lstStyle>
           <a:p>
             <a:r>
-              <a:rPr lang="en-US" smtClean="0"/>
+              <a:rPr lang="en-US"/>
               <a:t>Click to edit Master title style</a:t>
             </a:r>
-            <a:endParaRPr lang="en-US"/>
           </a:p>
         </p:txBody>
       </p:sp>
@@ -1427,7 +1417,7 @@
           <a:p>
             <a:pPr lvl="0"/>
             <a:r>
-              <a:rPr lang="en-US" smtClean="0"/>
+              <a:rPr lang="en-US"/>
               <a:t>Click to edit Master text styles</a:t>
             </a:r>
           </a:p>
@@ -1450,7 +1440,7 @@
           <a:p>
             <a:fld id="{7CB893AC-A63D-E544-9034-F1928B542F5E}" type="datetimeFigureOut">
               <a:rPr lang="en-US" smtClean="0"/>
-              <a:t>1/23/17</a:t>
+              <a:t>2/21/18</a:t>
             </a:fld>
             <a:endParaRPr lang="en-US"/>
           </a:p>
@@ -1544,10 +1534,9 @@
           <a:lstStyle/>
           <a:p>
             <a:r>
-              <a:rPr lang="en-US" smtClean="0"/>
+              <a:rPr lang="en-US"/>
               <a:t>Click to edit Master title style</a:t>
             </a:r>
-            <a:endParaRPr lang="en-US"/>
           </a:p>
         </p:txBody>
       </p:sp>
@@ -1573,38 +1562,37 @@
           <a:p>
             <a:pPr lvl="0"/>
             <a:r>
-              <a:rPr lang="en-US" smtClean="0"/>
+              <a:rPr lang="en-US"/>
               <a:t>Click to edit Master text styles</a:t>
             </a:r>
           </a:p>
           <a:p>
             <a:pPr lvl="1"/>
             <a:r>
-              <a:rPr lang="en-US" smtClean="0"/>
+              <a:rPr lang="en-US"/>
               <a:t>Second level</a:t>
             </a:r>
           </a:p>
           <a:p>
             <a:pPr lvl="2"/>
             <a:r>
-              <a:rPr lang="en-US" smtClean="0"/>
+              <a:rPr lang="en-US"/>
               <a:t>Third level</a:t>
             </a:r>
           </a:p>
           <a:p>
             <a:pPr lvl="3"/>
             <a:r>
-              <a:rPr lang="en-US" smtClean="0"/>
+              <a:rPr lang="en-US"/>
               <a:t>Fourth level</a:t>
             </a:r>
           </a:p>
           <a:p>
             <a:pPr lvl="4"/>
             <a:r>
-              <a:rPr lang="en-US" smtClean="0"/>
+              <a:rPr lang="en-US"/>
               <a:t>Fifth level</a:t>
             </a:r>
-            <a:endParaRPr lang="en-US"/>
           </a:p>
         </p:txBody>
       </p:sp>
@@ -1630,38 +1618,37 @@
           <a:p>
             <a:pPr lvl="0"/>
             <a:r>
-              <a:rPr lang="en-US" smtClean="0"/>
+              <a:rPr lang="en-US"/>
               <a:t>Click to edit Master text styles</a:t>
             </a:r>
           </a:p>
           <a:p>
             <a:pPr lvl="1"/>
             <a:r>
-              <a:rPr lang="en-US" smtClean="0"/>
+              <a:rPr lang="en-US"/>
               <a:t>Second level</a:t>
             </a:r>
           </a:p>
           <a:p>
             <a:pPr lvl="2"/>
             <a:r>
-              <a:rPr lang="en-US" smtClean="0"/>
+              <a:rPr lang="en-US"/>
               <a:t>Third level</a:t>
             </a:r>
           </a:p>
           <a:p>
             <a:pPr lvl="3"/>
             <a:r>
-              <a:rPr lang="en-US" smtClean="0"/>
+              <a:rPr lang="en-US"/>
               <a:t>Fourth level</a:t>
             </a:r>
           </a:p>
           <a:p>
             <a:pPr lvl="4"/>
             <a:r>
-              <a:rPr lang="en-US" smtClean="0"/>
+              <a:rPr lang="en-US"/>
               <a:t>Fifth level</a:t>
             </a:r>
-            <a:endParaRPr lang="en-US"/>
           </a:p>
         </p:txBody>
       </p:sp>
@@ -1682,7 +1669,7 @@
           <a:p>
             <a:fld id="{7CB893AC-A63D-E544-9034-F1928B542F5E}" type="datetimeFigureOut">
               <a:rPr lang="en-US" smtClean="0"/>
-              <a:t>1/23/17</a:t>
+              <a:t>2/21/18</a:t>
             </a:fld>
             <a:endParaRPr lang="en-US"/>
           </a:p>
@@ -1781,10 +1768,9 @@
           <a:lstStyle/>
           <a:p>
             <a:r>
-              <a:rPr lang="en-US" smtClean="0"/>
+              <a:rPr lang="en-US"/>
               <a:t>Click to edit Master title style</a:t>
             </a:r>
-            <a:endParaRPr lang="en-US"/>
           </a:p>
         </p:txBody>
       </p:sp>
@@ -1847,7 +1833,7 @@
           <a:p>
             <a:pPr lvl="0"/>
             <a:r>
-              <a:rPr lang="en-US" smtClean="0"/>
+              <a:rPr lang="en-US"/>
               <a:t>Click to edit Master text styles</a:t>
             </a:r>
           </a:p>
@@ -1875,38 +1861,37 @@
           <a:p>
             <a:pPr lvl="0"/>
             <a:r>
-              <a:rPr lang="en-US" smtClean="0"/>
+              <a:rPr lang="en-US"/>
               <a:t>Click to edit Master text styles</a:t>
             </a:r>
           </a:p>
           <a:p>
             <a:pPr lvl="1"/>
             <a:r>
-              <a:rPr lang="en-US" smtClean="0"/>
+              <a:rPr lang="en-US"/>
               <a:t>Second level</a:t>
             </a:r>
           </a:p>
           <a:p>
             <a:pPr lvl="2"/>
             <a:r>
-              <a:rPr lang="en-US" smtClean="0"/>
+              <a:rPr lang="en-US"/>
               <a:t>Third level</a:t>
             </a:r>
           </a:p>
           <a:p>
             <a:pPr lvl="3"/>
             <a:r>
-              <a:rPr lang="en-US" smtClean="0"/>
+              <a:rPr lang="en-US"/>
               <a:t>Fourth level</a:t>
             </a:r>
           </a:p>
           <a:p>
             <a:pPr lvl="4"/>
             <a:r>
-              <a:rPr lang="en-US" smtClean="0"/>
+              <a:rPr lang="en-US"/>
               <a:t>Fifth level</a:t>
             </a:r>
-            <a:endParaRPr lang="en-US"/>
           </a:p>
         </p:txBody>
       </p:sp>
@@ -1969,7 +1954,7 @@
           <a:p>
             <a:pPr lvl="0"/>
             <a:r>
-              <a:rPr lang="en-US" smtClean="0"/>
+              <a:rPr lang="en-US"/>
               <a:t>Click to edit Master text styles</a:t>
             </a:r>
           </a:p>
@@ -1997,38 +1982,37 @@
           <a:p>
             <a:pPr lvl="0"/>
             <a:r>
-              <a:rPr lang="en-US" smtClean="0"/>
+              <a:rPr lang="en-US"/>
               <a:t>Click to edit Master text styles</a:t>
             </a:r>
           </a:p>
           <a:p>
             <a:pPr lvl="1"/>
             <a:r>
-              <a:rPr lang="en-US" smtClean="0"/>
+              <a:rPr lang="en-US"/>
               <a:t>Second level</a:t>
             </a:r>
           </a:p>
           <a:p>
             <a:pPr lvl="2"/>
             <a:r>
-              <a:rPr lang="en-US" smtClean="0"/>
+              <a:rPr lang="en-US"/>
               <a:t>Third level</a:t>
             </a:r>
           </a:p>
           <a:p>
             <a:pPr lvl="3"/>
             <a:r>
-              <a:rPr lang="en-US" smtClean="0"/>
+              <a:rPr lang="en-US"/>
               <a:t>Fourth level</a:t>
             </a:r>
           </a:p>
           <a:p>
             <a:pPr lvl="4"/>
             <a:r>
-              <a:rPr lang="en-US" smtClean="0"/>
+              <a:rPr lang="en-US"/>
               <a:t>Fifth level</a:t>
             </a:r>
-            <a:endParaRPr lang="en-US"/>
           </a:p>
         </p:txBody>
       </p:sp>
@@ -2049,7 +2033,7 @@
           <a:p>
             <a:fld id="{7CB893AC-A63D-E544-9034-F1928B542F5E}" type="datetimeFigureOut">
               <a:rPr lang="en-US" smtClean="0"/>
-              <a:t>1/23/17</a:t>
+              <a:t>2/21/18</a:t>
             </a:fld>
             <a:endParaRPr lang="en-US"/>
           </a:p>
@@ -2143,10 +2127,9 @@
           <a:lstStyle/>
           <a:p>
             <a:r>
-              <a:rPr lang="en-US" smtClean="0"/>
+              <a:rPr lang="en-US"/>
               <a:t>Click to edit Master title style</a:t>
             </a:r>
-            <a:endParaRPr lang="en-US"/>
           </a:p>
         </p:txBody>
       </p:sp>
@@ -2167,7 +2150,7 @@
           <a:p>
             <a:fld id="{7CB893AC-A63D-E544-9034-F1928B542F5E}" type="datetimeFigureOut">
               <a:rPr lang="en-US" smtClean="0"/>
-              <a:t>1/23/17</a:t>
+              <a:t>2/21/18</a:t>
             </a:fld>
             <a:endParaRPr lang="en-US"/>
           </a:p>
@@ -2262,7 +2245,7 @@
           <a:p>
             <a:fld id="{7CB893AC-A63D-E544-9034-F1928B542F5E}" type="datetimeFigureOut">
               <a:rPr lang="en-US" smtClean="0"/>
-              <a:t>1/23/17</a:t>
+              <a:t>2/21/18</a:t>
             </a:fld>
             <a:endParaRPr lang="en-US"/>
           </a:p>
@@ -2365,10 +2348,9 @@
           </a:lstStyle>
           <a:p>
             <a:r>
-              <a:rPr lang="en-US" smtClean="0"/>
+              <a:rPr lang="en-US"/>
               <a:t>Click to edit Master title style</a:t>
             </a:r>
-            <a:endParaRPr lang="en-US"/>
           </a:p>
         </p:txBody>
       </p:sp>
@@ -2422,38 +2404,37 @@
           <a:p>
             <a:pPr lvl="0"/>
             <a:r>
-              <a:rPr lang="en-US" smtClean="0"/>
+              <a:rPr lang="en-US"/>
               <a:t>Click to edit Master text styles</a:t>
             </a:r>
           </a:p>
           <a:p>
             <a:pPr lvl="1"/>
             <a:r>
-              <a:rPr lang="en-US" smtClean="0"/>
+              <a:rPr lang="en-US"/>
               <a:t>Second level</a:t>
             </a:r>
           </a:p>
           <a:p>
             <a:pPr lvl="2"/>
             <a:r>
-              <a:rPr lang="en-US" smtClean="0"/>
+              <a:rPr lang="en-US"/>
               <a:t>Third level</a:t>
             </a:r>
           </a:p>
           <a:p>
             <a:pPr lvl="3"/>
             <a:r>
-              <a:rPr lang="en-US" smtClean="0"/>
+              <a:rPr lang="en-US"/>
               <a:t>Fourth level</a:t>
             </a:r>
           </a:p>
           <a:p>
             <a:pPr lvl="4"/>
             <a:r>
-              <a:rPr lang="en-US" smtClean="0"/>
+              <a:rPr lang="en-US"/>
               <a:t>Fifth level</a:t>
             </a:r>
-            <a:endParaRPr lang="en-US"/>
           </a:p>
         </p:txBody>
       </p:sp>
@@ -2516,7 +2497,7 @@
           <a:p>
             <a:pPr lvl="0"/>
             <a:r>
-              <a:rPr lang="en-US" smtClean="0"/>
+              <a:rPr lang="en-US"/>
               <a:t>Click to edit Master text styles</a:t>
             </a:r>
           </a:p>
@@ -2539,7 +2520,7 @@
           <a:p>
             <a:fld id="{7CB893AC-A63D-E544-9034-F1928B542F5E}" type="datetimeFigureOut">
               <a:rPr lang="en-US" smtClean="0"/>
-              <a:t>1/23/17</a:t>
+              <a:t>2/21/18</a:t>
             </a:fld>
             <a:endParaRPr lang="en-US"/>
           </a:p>
@@ -2642,10 +2623,9 @@
           </a:lstStyle>
           <a:p>
             <a:r>
-              <a:rPr lang="en-US" smtClean="0"/>
+              <a:rPr lang="en-US"/>
               <a:t>Click to edit Master title style</a:t>
             </a:r>
-            <a:endParaRPr lang="en-US"/>
           </a:p>
         </p:txBody>
       </p:sp>
@@ -2769,7 +2749,7 @@
           <a:p>
             <a:pPr lvl="0"/>
             <a:r>
-              <a:rPr lang="en-US" smtClean="0"/>
+              <a:rPr lang="en-US"/>
               <a:t>Click to edit Master text styles</a:t>
             </a:r>
           </a:p>
@@ -2792,7 +2772,7 @@
           <a:p>
             <a:fld id="{7CB893AC-A63D-E544-9034-F1928B542F5E}" type="datetimeFigureOut">
               <a:rPr lang="en-US" smtClean="0"/>
-              <a:t>1/23/17</a:t>
+              <a:t>2/21/18</a:t>
             </a:fld>
             <a:endParaRPr lang="en-US"/>
           </a:p>
@@ -2901,10 +2881,9 @@
           <a:lstStyle/>
           <a:p>
             <a:r>
-              <a:rPr lang="en-US" smtClean="0"/>
+              <a:rPr lang="en-US"/>
               <a:t>Click to edit Master title style</a:t>
             </a:r>
-            <a:endParaRPr lang="en-US"/>
           </a:p>
         </p:txBody>
       </p:sp>
@@ -2935,38 +2914,37 @@
           <a:p>
             <a:pPr lvl="0"/>
             <a:r>
-              <a:rPr lang="en-US" smtClean="0"/>
+              <a:rPr lang="en-US"/>
               <a:t>Click to edit Master text styles</a:t>
             </a:r>
           </a:p>
           <a:p>
             <a:pPr lvl="1"/>
             <a:r>
-              <a:rPr lang="en-US" smtClean="0"/>
+              <a:rPr lang="en-US"/>
               <a:t>Second level</a:t>
             </a:r>
           </a:p>
           <a:p>
             <a:pPr lvl="2"/>
             <a:r>
-              <a:rPr lang="en-US" smtClean="0"/>
+              <a:rPr lang="en-US"/>
               <a:t>Third level</a:t>
             </a:r>
           </a:p>
           <a:p>
             <a:pPr lvl="3"/>
             <a:r>
-              <a:rPr lang="en-US" smtClean="0"/>
+              <a:rPr lang="en-US"/>
               <a:t>Fourth level</a:t>
             </a:r>
           </a:p>
           <a:p>
             <a:pPr lvl="4"/>
             <a:r>
-              <a:rPr lang="en-US" smtClean="0"/>
+              <a:rPr lang="en-US"/>
               <a:t>Fifth level</a:t>
             </a:r>
-            <a:endParaRPr lang="en-US"/>
           </a:p>
         </p:txBody>
       </p:sp>
@@ -3005,7 +2983,7 @@
           <a:p>
             <a:fld id="{7CB893AC-A63D-E544-9034-F1928B542F5E}" type="datetimeFigureOut">
               <a:rPr lang="en-US" smtClean="0"/>
-              <a:t>1/23/17</a:t>
+              <a:t>2/21/18</a:t>
             </a:fld>
             <a:endParaRPr lang="en-US"/>
           </a:p>
@@ -3521,18 +3499,13 @@
             <a:p>
               <a:pPr algn="ctr"/>
               <a:r>
-                <a:rPr lang="en-US" sz="1600" dirty="0" smtClean="0">
+                <a:rPr lang="en-US" sz="1600" dirty="0">
                   <a:latin typeface="Arial" charset="0"/>
                   <a:ea typeface="Arial" charset="0"/>
                   <a:cs typeface="Arial" charset="0"/>
                 </a:rPr>
                 <a:t>The Research Bazaar is a worldwide festival promoting the digital literacy emerging at the center of modern research</a:t>
               </a:r>
-              <a:endParaRPr lang="en-US" sz="1600" dirty="0">
-                <a:latin typeface="Arial" charset="0"/>
-                <a:ea typeface="Arial" charset="0"/>
-                <a:cs typeface="Arial" charset="0"/>
-              </a:endParaRPr>
             </a:p>
           </p:txBody>
         </p:sp>
@@ -3560,7 +3533,7 @@
             <a:p>
               <a:pPr algn="ctr"/>
               <a:r>
-                <a:rPr lang="en-US" sz="1200" dirty="0" smtClean="0">
+                <a:rPr lang="en-US" sz="1200" dirty="0">
                   <a:latin typeface="Arial" charset="0"/>
                   <a:ea typeface="Arial" charset="0"/>
                   <a:cs typeface="Arial" charset="0"/>
@@ -3571,20 +3544,12 @@
             <a:p>
               <a:pPr algn="ctr"/>
               <a:r>
-                <a:rPr lang="en-US" sz="1200" dirty="0" smtClean="0">
-                  <a:latin typeface="Arial" charset="0"/>
-                  <a:ea typeface="Arial" charset="0"/>
-                  <a:cs typeface="Arial" charset="0"/>
-                </a:rPr>
-                <a:t>Nucleus Café, </a:t>
-              </a:r>
-              <a:r>
                 <a:rPr lang="en-US" sz="1200" dirty="0">
                   <a:latin typeface="Arial" charset="0"/>
                   <a:ea typeface="Arial" charset="0"/>
                   <a:cs typeface="Arial" charset="0"/>
                 </a:rPr>
-                <a:t>(Keating Building)</a:t>
+                <a:t>Nucleus Café, (Keating Building)</a:t>
               </a:r>
             </a:p>
             <a:p>
@@ -3624,7 +3589,7 @@
             <a:p>
               <a:pPr algn="ctr"/>
               <a:r>
-                <a:rPr lang="en-US" sz="1200" dirty="0" smtClean="0">
+                <a:rPr lang="en-US" sz="1200" dirty="0">
                   <a:latin typeface="Arial" charset="0"/>
                   <a:ea typeface="Arial" charset="0"/>
                   <a:cs typeface="Arial" charset="0"/>
@@ -3679,18 +3644,13 @@
             <a:lstStyle/>
             <a:p>
               <a:r>
-                <a:rPr lang="en-US" sz="1400" smtClean="0">
+                <a:rPr lang="en-US" sz="1400">
                   <a:latin typeface="Arial" charset="0"/>
                   <a:ea typeface="Arial" charset="0"/>
                   <a:cs typeface="Arial" charset="0"/>
                 </a:rPr>
                 <a:t>Not into mornings?</a:t>
               </a:r>
-              <a:endParaRPr lang="en-US" sz="1400">
-                <a:latin typeface="Arial" charset="0"/>
-                <a:ea typeface="Arial" charset="0"/>
-                <a:cs typeface="Arial" charset="0"/>
-              </a:endParaRPr>
             </a:p>
           </p:txBody>
         </p:sp>
@@ -3717,7 +3677,7 @@
             <a:lstStyle/>
             <a:p>
               <a:r>
-                <a:rPr lang="en-US" sz="1400" dirty="0" smtClean="0">
+                <a:rPr lang="en-US" sz="1400" dirty="0">
                   <a:latin typeface="Arial" charset="0"/>
                   <a:ea typeface="Arial" charset="0"/>
                   <a:cs typeface="Arial" charset="0"/>
@@ -3725,7 +3685,7 @@
                 <a:t>Not into the </a:t>
               </a:r>
               <a:r>
-                <a:rPr lang="en-US" sz="1400" smtClean="0">
+                <a:rPr lang="en-US" sz="1400">
                   <a:latin typeface="Arial" charset="0"/>
                   <a:ea typeface="Arial" charset="0"/>
                   <a:cs typeface="Arial" charset="0"/>
@@ -3783,13 +3743,6 @@
   <p:clrMapOvr>
     <a:masterClrMapping/>
   </p:clrMapOvr>
-  <p:timing>
-    <p:tnLst>
-      <p:par>
-        <p:cTn id="1" dur="indefinite" restart="never" nodeType="tmRoot"/>
-      </p:par>
-    </p:tnLst>
-  </p:timing>
 </p:sld>
 </file>
 
@@ -3910,7 +3863,7 @@
               <a:p>
                 <a:pPr algn="ctr"/>
                 <a:r>
-                  <a:rPr lang="en-US" sz="1600" dirty="0" smtClean="0">
+                  <a:rPr lang="en-US" sz="1600" dirty="0">
                     <a:latin typeface="Arial" charset="0"/>
                     <a:ea typeface="Arial" charset="0"/>
                     <a:cs typeface="Arial" charset="0"/>
@@ -3918,7 +3871,7 @@
                   <a:t>The Research Bazaar is a worldwide festival promoting the digital literacy emerging at the center of modern research. Check us out @</a:t>
                 </a:r>
                 <a:r>
-                  <a:rPr lang="en-US" sz="1600" dirty="0" err="1" smtClean="0">
+                  <a:rPr lang="en-US" sz="1600" dirty="0" err="1">
                     <a:latin typeface="Arial" charset="0"/>
                     <a:ea typeface="Arial" charset="0"/>
                     <a:cs typeface="Arial" charset="0"/>
@@ -3992,7 +3945,7 @@
               <a:lstStyle/>
               <a:p>
                 <a:r>
-                  <a:rPr lang="en-US" sz="1100" dirty="0" smtClean="0">
+                  <a:rPr lang="en-US" sz="1100" dirty="0">
                     <a:latin typeface="Arial" charset="0"/>
                     <a:ea typeface="Arial" charset="0"/>
                     <a:cs typeface="Arial" charset="0"/>
@@ -4000,7 +3953,7 @@
                   <a:t>* </a:t>
                 </a:r>
                 <a:r>
-                  <a:rPr lang="en-US" sz="1000" dirty="0" smtClean="0">
+                  <a:rPr lang="en-US" sz="1000" dirty="0">
                     <a:latin typeface="Arial" charset="0"/>
                     <a:ea typeface="Arial" charset="0"/>
                     <a:cs typeface="Arial" charset="0"/>
@@ -4008,22 +3961,17 @@
                   <a:t>No beverages are provided. But it’s still fun and fairly cheap one way or the other.</a:t>
                 </a:r>
                 <a:r>
-                  <a:rPr lang="en-US" sz="1000" baseline="30000" dirty="0" smtClean="0">
+                  <a:rPr lang="en-US" sz="1000" baseline="30000" dirty="0">
                     <a:latin typeface="Arial" charset="0"/>
                     <a:ea typeface="Arial" charset="0"/>
                     <a:cs typeface="Arial" charset="0"/>
                   </a:rPr>
                   <a:t>◆</a:t>
                 </a:r>
-                <a:endParaRPr lang="en-US" sz="1000" baseline="30000" dirty="0">
-                  <a:latin typeface="Arial" charset="0"/>
-                  <a:ea typeface="Arial" charset="0"/>
-                  <a:cs typeface="Arial" charset="0"/>
-                </a:endParaRPr>
               </a:p>
               <a:p>
                 <a:r>
-                  <a:rPr lang="en-US" sz="1000" baseline="30000" dirty="0" smtClean="0">
+                  <a:rPr lang="en-US" sz="1000" baseline="30000" dirty="0">
                     <a:latin typeface="Arial" charset="0"/>
                     <a:ea typeface="Arial" charset="0"/>
                     <a:cs typeface="Arial" charset="0"/>
@@ -4031,7 +3979,7 @@
                   <a:t>◆</a:t>
                 </a:r>
                 <a:r>
-                  <a:rPr lang="en-US" sz="1000" dirty="0" smtClean="0">
+                  <a:rPr lang="en-US" sz="1000" dirty="0">
                     <a:latin typeface="Arial" charset="0"/>
                     <a:ea typeface="Arial" charset="0"/>
                     <a:cs typeface="Arial" charset="0"/>
@@ -4039,18 +3987,13 @@
                   <a:t> Neither fun nor cheap is a guarantee. But if you are still reading this, and it’s funny: we feel more confident about the first part</a:t>
                 </a:r>
                 <a:r>
-                  <a:rPr lang="en-US" sz="1100" dirty="0" smtClean="0">
+                  <a:rPr lang="en-US" sz="1100" dirty="0">
                     <a:latin typeface="Arial" charset="0"/>
                     <a:ea typeface="Arial" charset="0"/>
                     <a:cs typeface="Arial" charset="0"/>
                   </a:rPr>
                   <a:t>.</a:t>
                 </a:r>
-                <a:endParaRPr lang="en-US" sz="1100" dirty="0">
-                  <a:latin typeface="Arial" charset="0"/>
-                  <a:ea typeface="Arial" charset="0"/>
-                  <a:cs typeface="Arial" charset="0"/>
-                </a:endParaRPr>
               </a:p>
             </p:txBody>
           </p:sp>
@@ -4080,7 +4023,7 @@
               <a:p>
                 <a:pPr algn="ctr"/>
                 <a:r>
-                  <a:rPr lang="en-US" sz="1600" dirty="0" smtClean="0">
+                  <a:rPr lang="en-US" sz="1600" dirty="0">
                     <a:latin typeface="Arial" charset="0"/>
                     <a:ea typeface="Arial" charset="0"/>
                     <a:cs typeface="Arial" charset="0"/>
@@ -4091,20 +4034,12 @@
               <a:p>
                 <a:pPr algn="ctr"/>
                 <a:r>
-                  <a:rPr lang="en-US" sz="1600" dirty="0" smtClean="0">
-                    <a:latin typeface="Arial" charset="0"/>
-                    <a:ea typeface="Arial" charset="0"/>
-                    <a:cs typeface="Arial" charset="0"/>
-                  </a:rPr>
-                  <a:t>Nucleus Café, </a:t>
-                </a:r>
-                <a:r>
                   <a:rPr lang="en-US" sz="1600" dirty="0">
                     <a:latin typeface="Arial" charset="0"/>
                     <a:ea typeface="Arial" charset="0"/>
                     <a:cs typeface="Arial" charset="0"/>
                   </a:rPr>
-                  <a:t>(Keating Building)</a:t>
+                  <a:t>Nucleus Café, (Keating Building)</a:t>
                 </a:r>
               </a:p>
               <a:p>
@@ -4146,7 +4081,7 @@
               <a:p>
                 <a:pPr algn="ctr"/>
                 <a:r>
-                  <a:rPr lang="en-US" sz="1600" dirty="0" smtClean="0">
+                  <a:rPr lang="en-US" sz="1600" dirty="0">
                     <a:latin typeface="Arial" charset="0"/>
                     <a:ea typeface="Arial" charset="0"/>
                     <a:cs typeface="Arial" charset="0"/>
@@ -4162,7 +4097,7 @@
                     <a:ea typeface="Arial" charset="0"/>
                     <a:cs typeface="Arial" charset="0"/>
                   </a:rPr>
-                  <a:t>Pasco (Main Gate Square) </a:t>
+                  <a:t>Gentle Ben’s (Main Gate Square) </a:t>
                 </a:r>
               </a:p>
               <a:p>
@@ -4173,7 +4108,7 @@
                     <a:ea typeface="Arial" charset="0"/>
                     <a:cs typeface="Arial" charset="0"/>
                   </a:rPr>
-                  <a:t>820 E University Blvd</a:t>
+                  <a:t>865 E University Blvd</a:t>
                 </a:r>
               </a:p>
             </p:txBody>
@@ -4201,18 +4136,13 @@
               <a:lstStyle/>
               <a:p>
                 <a:r>
-                  <a:rPr lang="en-US" smtClean="0">
+                  <a:rPr lang="en-US">
                     <a:latin typeface="Arial" charset="0"/>
                     <a:ea typeface="Arial" charset="0"/>
                     <a:cs typeface="Arial" charset="0"/>
                   </a:rPr>
                   <a:t>Not into mornings?</a:t>
                 </a:r>
-                <a:endParaRPr lang="en-US">
-                  <a:latin typeface="Arial" charset="0"/>
-                  <a:ea typeface="Arial" charset="0"/>
-                  <a:cs typeface="Arial" charset="0"/>
-                </a:endParaRPr>
               </a:p>
             </p:txBody>
           </p:sp>
@@ -4239,18 +4169,13 @@
               <a:lstStyle/>
               <a:p>
                 <a:r>
-                  <a:rPr lang="en-US" dirty="0" smtClean="0">
+                  <a:rPr lang="en-US" dirty="0">
                     <a:latin typeface="Arial" charset="0"/>
                     <a:ea typeface="Arial" charset="0"/>
                     <a:cs typeface="Arial" charset="0"/>
                   </a:rPr>
                   <a:t>Not into the bar scene?</a:t>
                 </a:r>
-                <a:endParaRPr lang="en-US" dirty="0">
-                  <a:latin typeface="Arial" charset="0"/>
-                  <a:ea typeface="Arial" charset="0"/>
-                  <a:cs typeface="Arial" charset="0"/>
-                </a:endParaRPr>
               </a:p>
             </p:txBody>
           </p:sp>
@@ -4348,18 +4273,13 @@
               <a:p>
                 <a:pPr algn="ctr"/>
                 <a:r>
-                  <a:rPr lang="en-US" sz="1900" b="1" dirty="0" smtClean="0">
+                  <a:rPr lang="en-US" sz="1900" b="1" dirty="0">
                     <a:latin typeface="Adobe Hebrew" charset="0"/>
                     <a:ea typeface="Adobe Hebrew" charset="0"/>
                     <a:cs typeface="Adobe Hebrew" charset="0"/>
                   </a:rPr>
                   <a:t>Need help with science or computers? Tired of quietly suffering trying to figure it out? Come hang out with us; it’s free!* Just want to hang out? Also free!*</a:t>
                 </a:r>
-                <a:endParaRPr lang="en-US" sz="1900" b="1" dirty="0">
-                  <a:latin typeface="Adobe Hebrew" charset="0"/>
-                  <a:ea typeface="Adobe Hebrew" charset="0"/>
-                  <a:cs typeface="Adobe Hebrew" charset="0"/>
-                </a:endParaRPr>
               </a:p>
             </p:txBody>
           </p:sp>
@@ -4498,13 +4418,6 @@
   <p:clrMapOvr>
     <a:masterClrMapping/>
   </p:clrMapOvr>
-  <p:timing>
-    <p:tnLst>
-      <p:par>
-        <p:cTn id="1" dur="indefinite" restart="never" nodeType="tmRoot"/>
-      </p:par>
-    </p:tnLst>
-  </p:timing>
 </p:sld>
 </file>
 
@@ -4684,7 +4597,7 @@
             <a:p>
               <a:pPr algn="ctr"/>
               <a:r>
-                <a:rPr lang="en-US" sz="1050" b="1" dirty="0" smtClean="0">
+                <a:rPr lang="en-US" sz="1050" b="1" dirty="0">
                   <a:latin typeface="Helvetica" charset="0"/>
                   <a:ea typeface="Helvetica" charset="0"/>
                   <a:cs typeface="Helvetica" charset="0"/>
@@ -4695,7 +4608,7 @@
             <a:p>
               <a:pPr algn="ctr"/>
               <a:r>
-                <a:rPr lang="en-US" sz="1050" b="1" dirty="0" smtClean="0">
+                <a:rPr lang="en-US" sz="1050" b="1" dirty="0">
                   <a:latin typeface="Helvetica" charset="0"/>
                   <a:ea typeface="Helvetica" charset="0"/>
                   <a:cs typeface="Helvetica" charset="0"/>
@@ -4703,7 +4616,7 @@
                 <a:t>Going? Hit us up @</a:t>
               </a:r>
               <a:r>
-                <a:rPr lang="en-US" sz="1050" b="1" dirty="0" err="1" smtClean="0">
+                <a:rPr lang="en-US" sz="1050" b="1" dirty="0" err="1">
                   <a:latin typeface="Helvetica" charset="0"/>
                   <a:ea typeface="Helvetica" charset="0"/>
                   <a:cs typeface="Helvetica" charset="0"/>
@@ -4711,7 +4624,7 @@
                 <a:t>resbazaz</a:t>
               </a:r>
               <a:r>
-                <a:rPr lang="en-US" sz="1050" b="1" dirty="0" smtClean="0">
+                <a:rPr lang="en-US" sz="1050" b="1" dirty="0">
                   <a:latin typeface="Helvetica" charset="0"/>
                   <a:ea typeface="Helvetica" charset="0"/>
                   <a:cs typeface="Helvetica" charset="0"/>
@@ -4871,18 +4784,13 @@
                 <a:lstStyle/>
                 <a:p>
                   <a:r>
-                    <a:rPr lang="en-US" dirty="0" smtClean="0">
+                    <a:rPr lang="en-US" dirty="0">
                       <a:latin typeface="Brush Script MT" charset="0"/>
                       <a:ea typeface="Brush Script MT" charset="0"/>
                       <a:cs typeface="Brush Script MT" charset="0"/>
                     </a:rPr>
                     <a:t>presents</a:t>
                   </a:r>
-                  <a:endParaRPr lang="en-US" dirty="0">
-                    <a:latin typeface="Brush Script MT" charset="0"/>
-                    <a:ea typeface="Brush Script MT" charset="0"/>
-                    <a:cs typeface="Brush Script MT" charset="0"/>
-                  </a:endParaRPr>
                 </a:p>
               </p:txBody>
             </p:sp>
@@ -4977,7 +4885,7 @@
                 <a:p>
                   <a:pPr algn="ctr"/>
                   <a:r>
-                    <a:rPr lang="en-US" sz="1050" b="1" dirty="0" smtClean="0">
+                    <a:rPr lang="en-US" sz="1050" b="1" dirty="0">
                       <a:latin typeface="Helvetica" charset="0"/>
                       <a:ea typeface="Helvetica" charset="0"/>
                       <a:cs typeface="Helvetica" charset="0"/>
@@ -4988,7 +4896,7 @@
                 <a:p>
                   <a:pPr algn="ctr"/>
                   <a:r>
-                    <a:rPr lang="en-US" sz="1050" b="1" dirty="0" smtClean="0">
+                    <a:rPr lang="en-US" sz="1050" b="1" dirty="0">
                       <a:latin typeface="Helvetica" charset="0"/>
                       <a:ea typeface="Helvetica" charset="0"/>
                       <a:cs typeface="Helvetica" charset="0"/>
@@ -4996,14 +4904,14 @@
                     <a:t>Going? Hit us up on       @</a:t>
                   </a:r>
                   <a:r>
-                    <a:rPr lang="en-US" sz="1050" b="1" dirty="0" err="1" smtClean="0">
+                    <a:rPr lang="en-US" sz="1050" b="1" dirty="0" err="1">
                       <a:latin typeface="Helvetica" charset="0"/>
                       <a:ea typeface="Helvetica" charset="0"/>
                       <a:cs typeface="Helvetica" charset="0"/>
                     </a:rPr>
                     <a:t>resbazaz</a:t>
                   </a:r>
-                  <a:endParaRPr lang="en-US" sz="1050" b="1" dirty="0" smtClean="0">
+                  <a:endParaRPr lang="en-US" sz="1050" b="1" dirty="0">
                     <a:latin typeface="Helvetica" charset="0"/>
                     <a:ea typeface="Helvetica" charset="0"/>
                     <a:cs typeface="Helvetica" charset="0"/>
@@ -5302,7 +5210,7 @@
                     </a:lnSpc>
                   </a:pPr>
                   <a:r>
-                    <a:rPr lang="en-US" sz="1400" b="1" dirty="0" smtClean="0">
+                    <a:rPr lang="en-US" sz="1400" b="1" dirty="0">
                       <a:latin typeface="Helvetica" charset="0"/>
                       <a:ea typeface="Helvetica" charset="0"/>
                       <a:cs typeface="Helvetica" charset="0"/>
@@ -5317,7 +5225,7 @@
                     </a:lnSpc>
                   </a:pPr>
                   <a:r>
-                    <a:rPr lang="en-US" sz="1400" b="1" dirty="0" smtClean="0">
+                    <a:rPr lang="en-US" sz="1400" b="1" dirty="0">
                       <a:latin typeface="Helvetica" charset="0"/>
                       <a:ea typeface="Helvetica" charset="0"/>
                       <a:cs typeface="Helvetica" charset="0"/>
@@ -5325,7 +5233,7 @@
                     <a:t>Going? Hit us up on         @</a:t>
                   </a:r>
                   <a:r>
-                    <a:rPr lang="en-US" sz="1400" b="1" dirty="0" err="1" smtClean="0">
+                    <a:rPr lang="en-US" sz="1400" b="1" dirty="0" err="1">
                       <a:latin typeface="Helvetica" charset="0"/>
                       <a:ea typeface="Helvetica" charset="0"/>
                       <a:cs typeface="Helvetica" charset="0"/>
@@ -5341,7 +5249,7 @@
                 <a:p>
                   <a:pPr algn="ctr"/>
                   <a:r>
-                    <a:rPr lang="en-US" sz="1100" b="1" dirty="0" smtClean="0">
+                    <a:rPr lang="en-US" sz="1100" b="1" dirty="0">
                       <a:latin typeface="Helvetica" charset="0"/>
                       <a:ea typeface="Helvetica" charset="0"/>
                       <a:cs typeface="Helvetica" charset="0"/>
@@ -5430,18 +5338,13 @@
             <a:lstStyle/>
             <a:p>
               <a:r>
-                <a:rPr lang="en-US" sz="2400" dirty="0" smtClean="0">
+                <a:rPr lang="en-US" sz="2400" dirty="0">
                   <a:latin typeface="Brush Script MT" charset="0"/>
                   <a:ea typeface="Brush Script MT" charset="0"/>
                   <a:cs typeface="Brush Script MT" charset="0"/>
                 </a:rPr>
                 <a:t>presents</a:t>
               </a:r>
-              <a:endParaRPr lang="en-US" sz="2400" dirty="0">
-                <a:latin typeface="Brush Script MT" charset="0"/>
-                <a:ea typeface="Brush Script MT" charset="0"/>
-                <a:cs typeface="Brush Script MT" charset="0"/>
-              </a:endParaRPr>
             </a:p>
           </p:txBody>
         </p:sp>
@@ -5527,13 +5430,6 @@
   <p:clrMapOvr>
     <a:masterClrMapping/>
   </p:clrMapOvr>
-  <p:timing>
-    <p:tnLst>
-      <p:par>
-        <p:cTn id="1" dur="indefinite" restart="never" nodeType="tmRoot"/>
-      </p:par>
-    </p:tnLst>
-  </p:timing>
 </p:sld>
 </file>
 

</xml_diff>

<commit_message>
Added Coffee and Code and updated all adverts
</commit_message>
<xml_diff>
--- a/material_design/ResBazAZ_advertising.pptx
+++ b/material_design/ResBazAZ_advertising.pptx
@@ -201,7 +201,7 @@
           <a:p>
             <a:fld id="{89557B8F-298D-0F41-8E5F-760EBE3A772C}" type="datetimeFigureOut">
               <a:rPr lang="en-US" smtClean="0"/>
-              <a:t>3/16/18</a:t>
+              <a:t>11/21/18</a:t>
             </a:fld>
             <a:endParaRPr lang="en-US"/>
           </a:p>
@@ -681,7 +681,7 @@
           <a:p>
             <a:fld id="{7CB893AC-A63D-E544-9034-F1928B542F5E}" type="datetimeFigureOut">
               <a:rPr lang="en-US" smtClean="0"/>
-              <a:t>3/16/18</a:t>
+              <a:t>11/21/18</a:t>
             </a:fld>
             <a:endParaRPr lang="en-US"/>
           </a:p>
@@ -849,7 +849,7 @@
           <a:p>
             <a:fld id="{7CB893AC-A63D-E544-9034-F1928B542F5E}" type="datetimeFigureOut">
               <a:rPr lang="en-US" smtClean="0"/>
-              <a:t>3/16/18</a:t>
+              <a:t>11/21/18</a:t>
             </a:fld>
             <a:endParaRPr lang="en-US"/>
           </a:p>
@@ -1027,7 +1027,7 @@
           <a:p>
             <a:fld id="{7CB893AC-A63D-E544-9034-F1928B542F5E}" type="datetimeFigureOut">
               <a:rPr lang="en-US" smtClean="0"/>
-              <a:t>3/16/18</a:t>
+              <a:t>11/21/18</a:t>
             </a:fld>
             <a:endParaRPr lang="en-US"/>
           </a:p>
@@ -1195,7 +1195,7 @@
           <a:p>
             <a:fld id="{7CB893AC-A63D-E544-9034-F1928B542F5E}" type="datetimeFigureOut">
               <a:rPr lang="en-US" smtClean="0"/>
-              <a:t>3/16/18</a:t>
+              <a:t>11/21/18</a:t>
             </a:fld>
             <a:endParaRPr lang="en-US"/>
           </a:p>
@@ -1440,7 +1440,7 @@
           <a:p>
             <a:fld id="{7CB893AC-A63D-E544-9034-F1928B542F5E}" type="datetimeFigureOut">
               <a:rPr lang="en-US" smtClean="0"/>
-              <a:t>3/16/18</a:t>
+              <a:t>11/21/18</a:t>
             </a:fld>
             <a:endParaRPr lang="en-US"/>
           </a:p>
@@ -1669,7 +1669,7 @@
           <a:p>
             <a:fld id="{7CB893AC-A63D-E544-9034-F1928B542F5E}" type="datetimeFigureOut">
               <a:rPr lang="en-US" smtClean="0"/>
-              <a:t>3/16/18</a:t>
+              <a:t>11/21/18</a:t>
             </a:fld>
             <a:endParaRPr lang="en-US"/>
           </a:p>
@@ -2033,7 +2033,7 @@
           <a:p>
             <a:fld id="{7CB893AC-A63D-E544-9034-F1928B542F5E}" type="datetimeFigureOut">
               <a:rPr lang="en-US" smtClean="0"/>
-              <a:t>3/16/18</a:t>
+              <a:t>11/21/18</a:t>
             </a:fld>
             <a:endParaRPr lang="en-US"/>
           </a:p>
@@ -2150,7 +2150,7 @@
           <a:p>
             <a:fld id="{7CB893AC-A63D-E544-9034-F1928B542F5E}" type="datetimeFigureOut">
               <a:rPr lang="en-US" smtClean="0"/>
-              <a:t>3/16/18</a:t>
+              <a:t>11/21/18</a:t>
             </a:fld>
             <a:endParaRPr lang="en-US"/>
           </a:p>
@@ -2245,7 +2245,7 @@
           <a:p>
             <a:fld id="{7CB893AC-A63D-E544-9034-F1928B542F5E}" type="datetimeFigureOut">
               <a:rPr lang="en-US" smtClean="0"/>
-              <a:t>3/16/18</a:t>
+              <a:t>11/21/18</a:t>
             </a:fld>
             <a:endParaRPr lang="en-US"/>
           </a:p>
@@ -2520,7 +2520,7 @@
           <a:p>
             <a:fld id="{7CB893AC-A63D-E544-9034-F1928B542F5E}" type="datetimeFigureOut">
               <a:rPr lang="en-US" smtClean="0"/>
-              <a:t>3/16/18</a:t>
+              <a:t>11/21/18</a:t>
             </a:fld>
             <a:endParaRPr lang="en-US"/>
           </a:p>
@@ -2772,7 +2772,7 @@
           <a:p>
             <a:fld id="{7CB893AC-A63D-E544-9034-F1928B542F5E}" type="datetimeFigureOut">
               <a:rPr lang="en-US" smtClean="0"/>
-              <a:t>3/16/18</a:t>
+              <a:t>11/21/18</a:t>
             </a:fld>
             <a:endParaRPr lang="en-US"/>
           </a:p>
@@ -2983,7 +2983,7 @@
           <a:p>
             <a:fld id="{7CB893AC-A63D-E544-9034-F1928B542F5E}" type="datetimeFigureOut">
               <a:rPr lang="en-US" smtClean="0"/>
-              <a:t>3/16/18</a:t>
+              <a:t>11/21/18</a:t>
             </a:fld>
             <a:endParaRPr lang="en-US"/>
           </a:p>
@@ -4222,20 +4222,14 @@
               <p:nvPr/>
             </p:nvPicPr>
             <p:blipFill rotWithShape="1">
-              <a:blip r:embed="rId5">
-                <a:extLst>
-                  <a:ext uri="{28A0092B-C50C-407E-A947-70E740481C1C}">
-                    <a14:useLocalDpi xmlns:a14="http://schemas.microsoft.com/office/drawing/2010/main" val="0"/>
-                  </a:ext>
-                </a:extLst>
-              </a:blip>
-              <a:srcRect b="21342"/>
+              <a:blip r:embed="rId5"/>
+              <a:srcRect b="21874"/>
               <a:stretch/>
             </p:blipFill>
             <p:spPr>
               <a:xfrm>
-                <a:off x="1700988" y="2979606"/>
-                <a:ext cx="4364617" cy="4442895"/>
+                <a:off x="1817598" y="2979607"/>
+                <a:ext cx="4394352" cy="4442894"/>
               </a:xfrm>
               <a:prstGeom prst="rect">
                 <a:avLst/>

</xml_diff>